<commit_message>
Added Conf 4 y 5, CP1
</commit_message>
<xml_diff>
--- a/Conf4.pptx
+++ b/Conf4.pptx
@@ -5,7 +5,7 @@
     <p:sldMasterId id="2147483677" r:id="rId1"/>
   </p:sldMasterIdLst>
   <p:notesMasterIdLst>
-    <p:notesMasterId r:id="rId35"/>
+    <p:notesMasterId r:id="rId36"/>
   </p:notesMasterIdLst>
   <p:sldIdLst>
     <p:sldId id="256" r:id="rId2"/>
@@ -30,17 +30,18 @@
     <p:sldId id="328" r:id="rId21"/>
     <p:sldId id="327" r:id="rId22"/>
     <p:sldId id="337" r:id="rId23"/>
-    <p:sldId id="336" r:id="rId24"/>
-    <p:sldId id="335" r:id="rId25"/>
-    <p:sldId id="334" r:id="rId26"/>
-    <p:sldId id="340" r:id="rId27"/>
-    <p:sldId id="341" r:id="rId28"/>
-    <p:sldId id="339" r:id="rId29"/>
-    <p:sldId id="338" r:id="rId30"/>
-    <p:sldId id="342" r:id="rId31"/>
-    <p:sldId id="343" r:id="rId32"/>
-    <p:sldId id="344" r:id="rId33"/>
-    <p:sldId id="284" r:id="rId34"/>
+    <p:sldId id="345" r:id="rId24"/>
+    <p:sldId id="336" r:id="rId25"/>
+    <p:sldId id="335" r:id="rId26"/>
+    <p:sldId id="334" r:id="rId27"/>
+    <p:sldId id="340" r:id="rId28"/>
+    <p:sldId id="341" r:id="rId29"/>
+    <p:sldId id="339" r:id="rId30"/>
+    <p:sldId id="338" r:id="rId31"/>
+    <p:sldId id="342" r:id="rId32"/>
+    <p:sldId id="343" r:id="rId33"/>
+    <p:sldId id="344" r:id="rId34"/>
+    <p:sldId id="284" r:id="rId35"/>
   </p:sldIdLst>
   <p:sldSz cx="9144000" cy="6858000" type="screen4x3"/>
   <p:notesSz cx="6858000" cy="9144000"/>
@@ -2844,7 +2845,7 @@
               <a:pPr>
                 <a:defRPr/>
               </a:pPr>
-              <a:t>11/1/2017</a:t>
+              <a:t>11/10/2017</a:t>
             </a:fld>
             <a:endParaRPr lang="en-US"/>
           </a:p>
@@ -3110,7 +3111,7 @@
               <a:pPr>
                 <a:defRPr/>
               </a:pPr>
-              <a:t>11/1/2017</a:t>
+              <a:t>11/10/2017</a:t>
             </a:fld>
             <a:endParaRPr lang="en-US"/>
           </a:p>
@@ -3322,7 +3323,7 @@
               <a:pPr>
                 <a:defRPr/>
               </a:pPr>
-              <a:t>11/1/2017</a:t>
+              <a:t>11/10/2017</a:t>
             </a:fld>
             <a:endParaRPr lang="en-US"/>
           </a:p>
@@ -3502,7 +3503,7 @@
               <a:pPr>
                 <a:defRPr/>
               </a:pPr>
-              <a:t>11/1/2017</a:t>
+              <a:t>11/10/2017</a:t>
             </a:fld>
             <a:endParaRPr lang="en-US"/>
           </a:p>
@@ -3704,7 +3705,7 @@
               <a:pPr>
                 <a:defRPr/>
               </a:pPr>
-              <a:t>11/1/2017</a:t>
+              <a:t>11/10/2017</a:t>
             </a:fld>
             <a:endParaRPr lang="en-US"/>
           </a:p>
@@ -3928,7 +3929,7 @@
               <a:pPr>
                 <a:defRPr/>
               </a:pPr>
-              <a:t>11/1/2017</a:t>
+              <a:t>11/10/2017</a:t>
             </a:fld>
             <a:endParaRPr lang="en-US"/>
           </a:p>
@@ -4248,7 +4249,7 @@
               <a:pPr>
                 <a:defRPr/>
               </a:pPr>
-              <a:t>11/1/2017</a:t>
+              <a:t>11/10/2017</a:t>
             </a:fld>
             <a:endParaRPr lang="en-US"/>
           </a:p>
@@ -4707,7 +4708,7 @@
               <a:pPr>
                 <a:defRPr/>
               </a:pPr>
-              <a:t>11/1/2017</a:t>
+              <a:t>11/10/2017</a:t>
             </a:fld>
             <a:endParaRPr lang="en-US"/>
           </a:p>
@@ -4852,7 +4853,7 @@
               <a:pPr>
                 <a:defRPr/>
               </a:pPr>
-              <a:t>11/1/2017</a:t>
+              <a:t>11/10/2017</a:t>
             </a:fld>
             <a:endParaRPr lang="en-US"/>
           </a:p>
@@ -4979,7 +4980,7 @@
               <a:pPr>
                 <a:defRPr/>
               </a:pPr>
-              <a:t>11/1/2017</a:t>
+              <a:t>11/10/2017</a:t>
             </a:fld>
             <a:endParaRPr lang="en-US"/>
           </a:p>
@@ -5288,7 +5289,7 @@
               <a:pPr>
                 <a:defRPr/>
               </a:pPr>
-              <a:t>11/1/2017</a:t>
+              <a:t>11/10/2017</a:t>
             </a:fld>
             <a:endParaRPr lang="en-US"/>
           </a:p>
@@ -5574,7 +5575,7 @@
               <a:pPr>
                 <a:defRPr/>
               </a:pPr>
-              <a:t>11/1/2017</a:t>
+              <a:t>11/10/2017</a:t>
             </a:fld>
             <a:endParaRPr lang="en-US"/>
           </a:p>
@@ -7241,7 +7242,7 @@
               <a:pPr>
                 <a:defRPr/>
               </a:pPr>
-              <a:t>11/1/2017</a:t>
+              <a:t>11/10/2017</a:t>
             </a:fld>
             <a:endParaRPr lang="en-US"/>
           </a:p>
@@ -13467,7 +13468,6 @@
               <a:rPr lang="es-ES_tradnl" altLang="es-MX" sz="2800" b="1" dirty="0" smtClean="0"/>
               <a:t>.1 Concepto.</a:t>
             </a:r>
-            <a:endParaRPr lang="es-ES_tradnl" altLang="es-MX" sz="2800" b="1" dirty="0" smtClean="0"/>
           </a:p>
           <a:p>
             <a:pPr eaLnBrk="1" hangingPunct="1"/>
@@ -15902,7 +15902,7 @@
       </p:sp>
       <p:sp>
         <p:nvSpPr>
-          <p:cNvPr id="7" name="Título 1"/>
+          <p:cNvPr id="6" name="Título 1"/>
           <p:cNvSpPr txBox="1">
             <a:spLocks/>
           </p:cNvSpPr>
@@ -16079,27 +16079,216 @@
           <a:p>
             <a:pPr eaLnBrk="1" hangingPunct="1"/>
             <a:r>
+              <a:rPr lang="es-ES_tradnl" altLang="es-MX" b="1" dirty="0" smtClean="0"/>
+              <a:t>4.3 </a:t>
+            </a:r>
+            <a:r>
               <a:rPr lang="es-ES_tradnl" altLang="es-MX" b="1" dirty="0"/>
-              <a:t>4</a:t>
-            </a:r>
-            <a:r>
-              <a:rPr lang="es-ES_tradnl" altLang="es-MX" b="1" dirty="0" smtClean="0"/>
-              <a:t>.4 Clases útiles de Java</a:t>
-            </a:r>
-            <a:endParaRPr lang="es-ES_tradnl" altLang="es-MX" b="1" dirty="0"/>
+              <a:t>Elementos de clase</a:t>
+            </a:r>
           </a:p>
         </p:txBody>
       </p:sp>
       <p:sp>
         <p:nvSpPr>
-          <p:cNvPr id="9" name="Rectángulo 8"/>
+          <p:cNvPr id="7" name="Título 1"/>
+          <p:cNvSpPr txBox="1">
+            <a:spLocks/>
+          </p:cNvSpPr>
+          <p:nvPr/>
+        </p:nvSpPr>
+        <p:spPr bwMode="auto">
+          <a:xfrm>
+            <a:off x="2057400" y="593119"/>
+            <a:ext cx="8229600" cy="1371600"/>
+          </a:xfrm>
+          <a:prstGeom prst="rect">
+            <a:avLst/>
+          </a:prstGeom>
+          <a:noFill/>
+          <a:ln>
+            <a:noFill/>
+          </a:ln>
+          <a:extLst>
+            <a:ext uri="{909E8E84-426E-40DD-AFC4-6F175D3DCCD1}">
+              <a14:hiddenFill xmlns:a14="http://schemas.microsoft.com/office/drawing/2010/main">
+                <a:solidFill>
+                  <a:srgbClr val="FFFFFF"/>
+                </a:solidFill>
+              </a14:hiddenFill>
+            </a:ext>
+            <a:ext uri="{91240B29-F687-4F45-9708-019B960494DF}">
+              <a14:hiddenLine xmlns:a14="http://schemas.microsoft.com/office/drawing/2010/main" w="9525">
+                <a:solidFill>
+                  <a:srgbClr val="000000"/>
+                </a:solidFill>
+                <a:miter lim="800000"/>
+                <a:headEnd/>
+                <a:tailEnd/>
+              </a14:hiddenLine>
+            </a:ext>
+          </a:extLst>
+        </p:spPr>
+        <p:txBody>
+          <a:bodyPr vert="horz" wrap="square" lIns="91440" tIns="45720" rIns="91440" bIns="45720" numCol="1" anchor="ctr" anchorCtr="0" compatLnSpc="1">
+            <a:prstTxWarp prst="textNoShape">
+              <a:avLst/>
+            </a:prstTxWarp>
+          </a:bodyPr>
+          <a:lstStyle>
+            <a:lvl1pPr algn="l" rtl="0" eaLnBrk="0" fontAlgn="base" hangingPunct="0">
+              <a:spcBef>
+                <a:spcPct val="0"/>
+              </a:spcBef>
+              <a:spcAft>
+                <a:spcPct val="0"/>
+              </a:spcAft>
+              <a:defRPr sz="4400">
+                <a:solidFill>
+                  <a:schemeClr val="tx1"/>
+                </a:solidFill>
+                <a:latin typeface="+mj-lt"/>
+                <a:ea typeface="+mj-ea"/>
+                <a:cs typeface="+mj-cs"/>
+              </a:defRPr>
+            </a:lvl1pPr>
+            <a:lvl2pPr algn="l" rtl="0" eaLnBrk="0" fontAlgn="base" hangingPunct="0">
+              <a:spcBef>
+                <a:spcPct val="0"/>
+              </a:spcBef>
+              <a:spcAft>
+                <a:spcPct val="0"/>
+              </a:spcAft>
+              <a:defRPr sz="4400">
+                <a:solidFill>
+                  <a:schemeClr val="tx1"/>
+                </a:solidFill>
+                <a:latin typeface="Arial" pitchFamily="34" charset="0"/>
+              </a:defRPr>
+            </a:lvl2pPr>
+            <a:lvl3pPr algn="l" rtl="0" eaLnBrk="0" fontAlgn="base" hangingPunct="0">
+              <a:spcBef>
+                <a:spcPct val="0"/>
+              </a:spcBef>
+              <a:spcAft>
+                <a:spcPct val="0"/>
+              </a:spcAft>
+              <a:defRPr sz="4400">
+                <a:solidFill>
+                  <a:schemeClr val="tx1"/>
+                </a:solidFill>
+                <a:latin typeface="Arial" pitchFamily="34" charset="0"/>
+              </a:defRPr>
+            </a:lvl3pPr>
+            <a:lvl4pPr algn="l" rtl="0" eaLnBrk="0" fontAlgn="base" hangingPunct="0">
+              <a:spcBef>
+                <a:spcPct val="0"/>
+              </a:spcBef>
+              <a:spcAft>
+                <a:spcPct val="0"/>
+              </a:spcAft>
+              <a:defRPr sz="4400">
+                <a:solidFill>
+                  <a:schemeClr val="tx1"/>
+                </a:solidFill>
+                <a:latin typeface="Arial" pitchFamily="34" charset="0"/>
+              </a:defRPr>
+            </a:lvl4pPr>
+            <a:lvl5pPr algn="l" rtl="0" eaLnBrk="0" fontAlgn="base" hangingPunct="0">
+              <a:spcBef>
+                <a:spcPct val="0"/>
+              </a:spcBef>
+              <a:spcAft>
+                <a:spcPct val="0"/>
+              </a:spcAft>
+              <a:defRPr sz="4400">
+                <a:solidFill>
+                  <a:schemeClr val="tx1"/>
+                </a:solidFill>
+                <a:latin typeface="Arial" pitchFamily="34" charset="0"/>
+              </a:defRPr>
+            </a:lvl5pPr>
+            <a:lvl6pPr marL="457200" algn="l" rtl="0" fontAlgn="base">
+              <a:spcBef>
+                <a:spcPct val="0"/>
+              </a:spcBef>
+              <a:spcAft>
+                <a:spcPct val="0"/>
+              </a:spcAft>
+              <a:defRPr sz="4400">
+                <a:solidFill>
+                  <a:schemeClr val="tx1"/>
+                </a:solidFill>
+                <a:latin typeface="Arial" pitchFamily="34" charset="0"/>
+              </a:defRPr>
+            </a:lvl6pPr>
+            <a:lvl7pPr marL="914400" algn="l" rtl="0" fontAlgn="base">
+              <a:spcBef>
+                <a:spcPct val="0"/>
+              </a:spcBef>
+              <a:spcAft>
+                <a:spcPct val="0"/>
+              </a:spcAft>
+              <a:defRPr sz="4400">
+                <a:solidFill>
+                  <a:schemeClr val="tx1"/>
+                </a:solidFill>
+                <a:latin typeface="Arial" pitchFamily="34" charset="0"/>
+              </a:defRPr>
+            </a:lvl7pPr>
+            <a:lvl8pPr marL="1371600" algn="l" rtl="0" fontAlgn="base">
+              <a:spcBef>
+                <a:spcPct val="0"/>
+              </a:spcBef>
+              <a:spcAft>
+                <a:spcPct val="0"/>
+              </a:spcAft>
+              <a:defRPr sz="4400">
+                <a:solidFill>
+                  <a:schemeClr val="tx1"/>
+                </a:solidFill>
+                <a:latin typeface="Arial" pitchFamily="34" charset="0"/>
+              </a:defRPr>
+            </a:lvl8pPr>
+            <a:lvl9pPr marL="1828800" algn="l" rtl="0" fontAlgn="base">
+              <a:spcBef>
+                <a:spcPct val="0"/>
+              </a:spcBef>
+              <a:spcAft>
+                <a:spcPct val="0"/>
+              </a:spcAft>
+              <a:defRPr sz="4400">
+                <a:solidFill>
+                  <a:schemeClr val="tx1"/>
+                </a:solidFill>
+                <a:latin typeface="Arial" pitchFamily="34" charset="0"/>
+              </a:defRPr>
+            </a:lvl9pPr>
+          </a:lstStyle>
+          <a:p>
+            <a:pPr eaLnBrk="1" hangingPunct="1"/>
+            <a:r>
+              <a:rPr lang="es-ES_tradnl" altLang="es-MX" sz="2000" b="1" dirty="0" smtClean="0">
+                <a:latin typeface="+mn-lt"/>
+              </a:rPr>
+              <a:t>Realizar ejemplos en el IDE</a:t>
+            </a:r>
+            <a:endParaRPr lang="es-ES_tradnl" altLang="es-MX" sz="2000" b="1" dirty="0">
+              <a:latin typeface="+mn-lt"/>
+            </a:endParaRPr>
+          </a:p>
+        </p:txBody>
+      </p:sp>
+      <p:sp>
+        <p:nvSpPr>
+          <p:cNvPr id="8" name="Rectángulo 7"/>
           <p:cNvSpPr/>
           <p:nvPr/>
         </p:nvSpPr>
         <p:spPr>
           <a:xfrm>
-            <a:off x="0" y="1055315"/>
-            <a:ext cx="4953000" cy="461665"/>
+            <a:off x="467591" y="1625425"/>
+            <a:ext cx="8229600" cy="4832092"/>
           </a:xfrm>
           <a:prstGeom prst="rect">
             <a:avLst/>
@@ -16111,144 +16300,437 @@
           </a:bodyPr>
           <a:lstStyle/>
           <a:p>
-            <a:pPr lvl="1" eaLnBrk="1" hangingPunct="1"/>
-            <a:r>
-              <a:rPr lang="es-ES_tradnl" altLang="es-MX" sz="2400" b="1" dirty="0" smtClean="0"/>
-              <a:t>Arreglos:</a:t>
-            </a:r>
-            <a:endParaRPr lang="es-ES_tradnl" altLang="es-MX" sz="2400" b="1" dirty="0"/>
-          </a:p>
-        </p:txBody>
-      </p:sp>
-      <p:sp>
-        <p:nvSpPr>
-          <p:cNvPr id="10" name="Rectángulo 9"/>
-          <p:cNvSpPr/>
-          <p:nvPr/>
-        </p:nvSpPr>
-        <p:spPr>
-          <a:xfrm>
-            <a:off x="408709" y="1575060"/>
-            <a:ext cx="8524009" cy="4755148"/>
-          </a:xfrm>
-          <a:prstGeom prst="rect">
-            <a:avLst/>
-          </a:prstGeom>
-        </p:spPr>
-        <p:txBody>
-          <a:bodyPr wrap="square">
-            <a:spAutoFit/>
-          </a:bodyPr>
-          <a:lstStyle/>
-          <a:p>
-            <a:pPr algn="just">
-              <a:spcBef>
-                <a:spcPts val="600"/>
-              </a:spcBef>
+            <a:pPr lvl="0">
               <a:spcAft>
                 <a:spcPts val="0"/>
               </a:spcAft>
+              <a:tabLst>
+                <a:tab pos="457200" algn="l"/>
+              </a:tabLst>
             </a:pPr>
             <a:r>
-              <a:rPr lang="es-ES_tradnl" sz="2400" dirty="0">
-                <a:latin typeface="+mn-lt"/>
-                <a:ea typeface="Times New Roman" panose="02020603050405020304" pitchFamily="18" charset="0"/>
-              </a:rPr>
-              <a:t>Suponga que se quiere diseñar e implementar una clase </a:t>
-            </a:r>
-            <a:r>
-              <a:rPr lang="es-ES_tradnl" sz="2400" i="1" dirty="0" err="1">
-                <a:latin typeface="+mn-lt"/>
-                <a:ea typeface="Times New Roman" panose="02020603050405020304" pitchFamily="18" charset="0"/>
-              </a:rPr>
-              <a:t>PruebaParcial</a:t>
-            </a:r>
-            <a:r>
-              <a:rPr lang="es-ES_tradnl" sz="2400" dirty="0">
-                <a:latin typeface="+mn-lt"/>
-                <a:ea typeface="Times New Roman" panose="02020603050405020304" pitchFamily="18" charset="0"/>
-              </a:rPr>
-              <a:t> que almacene las notas de una prueba parcial y sea capaz de encontrar el promedio de dichas notas, además determinar la cantidad de cada una de las notas.</a:t>
-            </a:r>
-            <a:endParaRPr lang="es-MX" sz="2400" dirty="0">
+              <a:rPr lang="es-ES_tradnl" sz="2200" dirty="0">
+                <a:latin typeface="+mn-lt"/>
+                <a:ea typeface="Times New Roman" panose="02020603050405020304" pitchFamily="18" charset="0"/>
+              </a:rPr>
+              <a:t>Implementar una clase Rectángulo que permita calcular su área y </a:t>
+            </a:r>
+            <a:r>
+              <a:rPr lang="es-ES_tradnl" sz="2200" dirty="0" smtClean="0">
+                <a:latin typeface="+mn-lt"/>
+                <a:ea typeface="Times New Roman" panose="02020603050405020304" pitchFamily="18" charset="0"/>
+              </a:rPr>
+              <a:t>perímetro. (Hacer uso de la palabra reservada </a:t>
+            </a:r>
+            <a:r>
+              <a:rPr lang="es-ES_tradnl" sz="2200" b="1" i="1" dirty="0" err="1" smtClean="0">
+                <a:latin typeface="+mn-lt"/>
+                <a:ea typeface="Times New Roman" panose="02020603050405020304" pitchFamily="18" charset="0"/>
+              </a:rPr>
+              <a:t>this</a:t>
+            </a:r>
+            <a:r>
+              <a:rPr lang="es-ES_tradnl" sz="2200" dirty="0" smtClean="0">
+                <a:latin typeface="+mn-lt"/>
+                <a:ea typeface="Times New Roman" panose="02020603050405020304" pitchFamily="18" charset="0"/>
+              </a:rPr>
+              <a:t>)</a:t>
+            </a:r>
+          </a:p>
+          <a:p>
+            <a:pPr lvl="0">
+              <a:spcAft>
+                <a:spcPts val="0"/>
+              </a:spcAft>
+              <a:tabLst>
+                <a:tab pos="457200" algn="l"/>
+              </a:tabLst>
+            </a:pPr>
+            <a:endParaRPr lang="es-ES_tradnl" sz="2200" dirty="0" smtClean="0">
               <a:latin typeface="+mn-lt"/>
               <a:ea typeface="Times New Roman" panose="02020603050405020304" pitchFamily="18" charset="0"/>
             </a:endParaRPr>
           </a:p>
           <a:p>
-            <a:pPr algn="just">
-              <a:spcBef>
-                <a:spcPts val="600"/>
-              </a:spcBef>
+            <a:pPr lvl="0">
               <a:spcAft>
                 <a:spcPts val="0"/>
               </a:spcAft>
+              <a:tabLst>
+                <a:tab pos="457200" algn="l"/>
+              </a:tabLst>
             </a:pPr>
-            <a:endParaRPr lang="es-ES_tradnl" sz="2400" dirty="0" smtClean="0">
+            <a:r>
+              <a:rPr lang="es-ES_tradnl" sz="2200" dirty="0" smtClean="0">
+                <a:latin typeface="+mn-lt"/>
+                <a:ea typeface="Times New Roman" panose="02020603050405020304" pitchFamily="18" charset="0"/>
+              </a:rPr>
+              <a:t>Clase “</a:t>
+            </a:r>
+            <a:r>
+              <a:rPr lang="es-ES_tradnl" sz="2200" i="1" dirty="0" err="1" smtClean="0">
+                <a:latin typeface="+mn-lt"/>
+                <a:ea typeface="Times New Roman" panose="02020603050405020304" pitchFamily="18" charset="0"/>
+              </a:rPr>
+              <a:t>Rectangulo</a:t>
+            </a:r>
+            <a:r>
+              <a:rPr lang="es-ES_tradnl" sz="2200" dirty="0" smtClean="0">
+                <a:latin typeface="+mn-lt"/>
+                <a:ea typeface="Times New Roman" panose="02020603050405020304" pitchFamily="18" charset="0"/>
+              </a:rPr>
+              <a:t>”</a:t>
+            </a:r>
+            <a:endParaRPr lang="es-ES_tradnl" sz="2200" dirty="0">
               <a:latin typeface="+mn-lt"/>
               <a:ea typeface="Times New Roman" panose="02020603050405020304" pitchFamily="18" charset="0"/>
             </a:endParaRPr>
           </a:p>
           <a:p>
-            <a:pPr algn="just">
-              <a:spcBef>
-                <a:spcPts val="600"/>
-              </a:spcBef>
+            <a:pPr lvl="0">
               <a:spcAft>
                 <a:spcPts val="0"/>
               </a:spcAft>
+              <a:tabLst>
+                <a:tab pos="457200" algn="l"/>
+              </a:tabLst>
             </a:pPr>
             <a:r>
-              <a:rPr lang="es-ES_tradnl" sz="2400" dirty="0" smtClean="0">
-                <a:latin typeface="+mn-lt"/>
-                <a:ea typeface="Times New Roman" panose="02020603050405020304" pitchFamily="18" charset="0"/>
-              </a:rPr>
-              <a:t>Los </a:t>
-            </a:r>
-            <a:r>
-              <a:rPr lang="es-ES_tradnl" sz="2400" dirty="0">
-                <a:latin typeface="+mn-lt"/>
-                <a:ea typeface="Times New Roman" panose="02020603050405020304" pitchFamily="18" charset="0"/>
-              </a:rPr>
-              <a:t>atributos que se han estudiado hasta el momento permiten almacenar un único dato: un valor entero, o un valor flotante, o un valor doble, o un carácter, o un valor lógico. </a:t>
-            </a:r>
-            <a:endParaRPr lang="es-ES_tradnl" sz="2400" dirty="0" smtClean="0">
+              <a:rPr lang="es-ES_tradnl" sz="2200" b="1" dirty="0" smtClean="0">
+                <a:latin typeface="+mn-lt"/>
+                <a:ea typeface="Times New Roman" panose="02020603050405020304" pitchFamily="18" charset="0"/>
+              </a:rPr>
+              <a:t>Atributos:</a:t>
+            </a:r>
+          </a:p>
+          <a:p>
+            <a:pPr lvl="0">
+              <a:spcAft>
+                <a:spcPts val="0"/>
+              </a:spcAft>
+              <a:tabLst>
+                <a:tab pos="457200" algn="l"/>
+              </a:tabLst>
+            </a:pPr>
+            <a:r>
+              <a:rPr lang="en-US" sz="2200" dirty="0" smtClean="0">
+                <a:latin typeface="+mn-lt"/>
+                <a:ea typeface="Times New Roman" panose="02020603050405020304" pitchFamily="18" charset="0"/>
+              </a:rPr>
+              <a:t>-largo: double</a:t>
+            </a:r>
+          </a:p>
+          <a:p>
+            <a:pPr lvl="0">
+              <a:spcAft>
+                <a:spcPts val="0"/>
+              </a:spcAft>
+              <a:tabLst>
+                <a:tab pos="457200" algn="l"/>
+              </a:tabLst>
+            </a:pPr>
+            <a:r>
+              <a:rPr lang="en-US" sz="2200" dirty="0" smtClean="0">
+                <a:latin typeface="+mn-lt"/>
+                <a:ea typeface="Times New Roman" panose="02020603050405020304" pitchFamily="18" charset="0"/>
+              </a:rPr>
+              <a:t>-ancho: double</a:t>
+            </a:r>
+          </a:p>
+          <a:p>
+            <a:pPr lvl="0">
+              <a:spcAft>
+                <a:spcPts val="0"/>
+              </a:spcAft>
+              <a:tabLst>
+                <a:tab pos="457200" algn="l"/>
+              </a:tabLst>
+            </a:pPr>
+            <a:r>
+              <a:rPr lang="en-US" sz="2200" b="1" dirty="0" err="1" smtClean="0">
+                <a:latin typeface="+mn-lt"/>
+                <a:ea typeface="Times New Roman" panose="02020603050405020304" pitchFamily="18" charset="0"/>
+              </a:rPr>
+              <a:t>Métodos</a:t>
+            </a:r>
+            <a:r>
+              <a:rPr lang="es-MX" sz="2200" b="1" dirty="0" smtClean="0">
+                <a:latin typeface="+mn-lt"/>
+                <a:ea typeface="Times New Roman" panose="02020603050405020304" pitchFamily="18" charset="0"/>
+              </a:rPr>
+              <a:t>:</a:t>
+            </a:r>
+          </a:p>
+          <a:p>
+            <a:pPr lvl="0">
+              <a:spcAft>
+                <a:spcPts val="0"/>
+              </a:spcAft>
+              <a:tabLst>
+                <a:tab pos="457200" algn="l"/>
+              </a:tabLst>
+            </a:pPr>
+            <a:r>
+              <a:rPr lang="en-US" sz="2200" dirty="0" smtClean="0">
+                <a:latin typeface="+mn-lt"/>
+                <a:ea typeface="Times New Roman" panose="02020603050405020304" pitchFamily="18" charset="0"/>
+              </a:rPr>
+              <a:t>+</a:t>
+            </a:r>
+            <a:r>
+              <a:rPr lang="en-US" sz="2200" dirty="0" err="1" smtClean="0">
+                <a:latin typeface="+mn-lt"/>
+                <a:ea typeface="Times New Roman" panose="02020603050405020304" pitchFamily="18" charset="0"/>
+              </a:rPr>
+              <a:t>Rectangulo</a:t>
+            </a:r>
+            <a:r>
+              <a:rPr lang="en-US" sz="2200" dirty="0" smtClean="0">
+                <a:latin typeface="+mn-lt"/>
+                <a:ea typeface="Times New Roman" panose="02020603050405020304" pitchFamily="18" charset="0"/>
+              </a:rPr>
+              <a:t>(largo, ancho : double)</a:t>
+            </a:r>
+          </a:p>
+          <a:p>
+            <a:pPr lvl="0">
+              <a:spcAft>
+                <a:spcPts val="0"/>
+              </a:spcAft>
+              <a:tabLst>
+                <a:tab pos="457200" algn="l"/>
+              </a:tabLst>
+            </a:pPr>
+            <a:r>
+              <a:rPr lang="en-US" sz="2200" dirty="0" smtClean="0">
+                <a:latin typeface="+mn-lt"/>
+                <a:ea typeface="Times New Roman" panose="02020603050405020304" pitchFamily="18" charset="0"/>
+              </a:rPr>
+              <a:t>+</a:t>
+            </a:r>
+            <a:r>
+              <a:rPr lang="en-US" sz="2200" dirty="0" err="1" smtClean="0">
+                <a:latin typeface="+mn-lt"/>
+                <a:ea typeface="Times New Roman" panose="02020603050405020304" pitchFamily="18" charset="0"/>
+              </a:rPr>
+              <a:t>CalcularArea</a:t>
+            </a:r>
+            <a:r>
+              <a:rPr lang="en-US" sz="2200" dirty="0" smtClean="0">
+                <a:latin typeface="+mn-lt"/>
+                <a:ea typeface="Times New Roman" panose="02020603050405020304" pitchFamily="18" charset="0"/>
+              </a:rPr>
+              <a:t>() : double</a:t>
+            </a:r>
+          </a:p>
+          <a:p>
+            <a:pPr lvl="0">
+              <a:spcAft>
+                <a:spcPts val="0"/>
+              </a:spcAft>
+              <a:tabLst>
+                <a:tab pos="457200" algn="l"/>
+              </a:tabLst>
+            </a:pPr>
+            <a:r>
+              <a:rPr lang="en-US" sz="2200" dirty="0" smtClean="0">
+                <a:latin typeface="+mn-lt"/>
+                <a:ea typeface="Times New Roman" panose="02020603050405020304" pitchFamily="18" charset="0"/>
+              </a:rPr>
+              <a:t>+</a:t>
+            </a:r>
+            <a:r>
+              <a:rPr lang="en-US" sz="2200" dirty="0" err="1" smtClean="0">
+                <a:latin typeface="+mn-lt"/>
+                <a:ea typeface="Times New Roman" panose="02020603050405020304" pitchFamily="18" charset="0"/>
+              </a:rPr>
+              <a:t>CalcularPerimetro</a:t>
+            </a:r>
+            <a:r>
+              <a:rPr lang="en-US" sz="2200" dirty="0" smtClean="0">
+                <a:latin typeface="+mn-lt"/>
+                <a:ea typeface="Times New Roman" panose="02020603050405020304" pitchFamily="18" charset="0"/>
+              </a:rPr>
+              <a:t>() : double</a:t>
+            </a:r>
+          </a:p>
+          <a:p>
+            <a:pPr lvl="0">
+              <a:spcAft>
+                <a:spcPts val="0"/>
+              </a:spcAft>
+              <a:tabLst>
+                <a:tab pos="457200" algn="l"/>
+              </a:tabLst>
+            </a:pPr>
+            <a:endParaRPr lang="en-US" sz="2200" dirty="0">
               <a:latin typeface="+mn-lt"/>
               <a:ea typeface="Times New Roman" panose="02020603050405020304" pitchFamily="18" charset="0"/>
             </a:endParaRPr>
           </a:p>
           <a:p>
-            <a:pPr algn="just">
-              <a:spcBef>
-                <a:spcPts val="600"/>
-              </a:spcBef>
+            <a:pPr lvl="0">
               <a:spcAft>
                 <a:spcPts val="0"/>
               </a:spcAft>
+              <a:tabLst>
+                <a:tab pos="457200" algn="l"/>
+              </a:tabLst>
             </a:pPr>
-            <a:endParaRPr lang="es-MX" sz="2400" dirty="0">
-              <a:latin typeface="+mn-lt"/>
-              <a:ea typeface="Times New Roman" panose="02020603050405020304" pitchFamily="18" charset="0"/>
-            </a:endParaRPr>
-          </a:p>
-          <a:p>
-            <a:r>
-              <a:rPr lang="es-ES_tradnl" sz="2400" dirty="0">
-                <a:latin typeface="+mn-lt"/>
-                <a:ea typeface="Times New Roman" panose="02020603050405020304" pitchFamily="18" charset="0"/>
-              </a:rPr>
-              <a:t>Se necesita un tipo de dato donde se pueda almacenar no un único valor sino un conjunto de valores (las notas de todos los estudiantes). </a:t>
-            </a:r>
-            <a:endParaRPr lang="es-MX" sz="2400" dirty="0">
-              <a:latin typeface="+mn-lt"/>
-            </a:endParaRPr>
+            <a:r>
+              <a:rPr lang="en-US" sz="2200" dirty="0" smtClean="0">
+                <a:latin typeface="+mn-lt"/>
+                <a:ea typeface="Times New Roman" panose="02020603050405020304" pitchFamily="18" charset="0"/>
+              </a:rPr>
+              <a:t>Los </a:t>
+            </a:r>
+            <a:r>
+              <a:rPr lang="en-US" sz="2200" dirty="0" err="1" smtClean="0">
+                <a:latin typeface="+mn-lt"/>
+                <a:ea typeface="Times New Roman" panose="02020603050405020304" pitchFamily="18" charset="0"/>
+              </a:rPr>
+              <a:t>atributos</a:t>
+            </a:r>
+            <a:r>
+              <a:rPr lang="en-US" sz="2200" dirty="0" smtClean="0">
+                <a:latin typeface="+mn-lt"/>
+                <a:ea typeface="Times New Roman" panose="02020603050405020304" pitchFamily="18" charset="0"/>
+              </a:rPr>
+              <a:t> </a:t>
+            </a:r>
+            <a:r>
+              <a:rPr lang="en-US" sz="2200" dirty="0" err="1" smtClean="0">
+                <a:latin typeface="+mn-lt"/>
+                <a:ea typeface="Times New Roman" panose="02020603050405020304" pitchFamily="18" charset="0"/>
+              </a:rPr>
+              <a:t>deben</a:t>
+            </a:r>
+            <a:r>
+              <a:rPr lang="en-US" sz="2200" dirty="0" smtClean="0">
+                <a:latin typeface="+mn-lt"/>
+                <a:ea typeface="Times New Roman" panose="02020603050405020304" pitchFamily="18" charset="0"/>
+              </a:rPr>
+              <a:t> </a:t>
+            </a:r>
+            <a:r>
+              <a:rPr lang="en-US" sz="2200" dirty="0" err="1" smtClean="0">
+                <a:latin typeface="+mn-lt"/>
+                <a:ea typeface="Times New Roman" panose="02020603050405020304" pitchFamily="18" charset="0"/>
+              </a:rPr>
+              <a:t>ser</a:t>
+            </a:r>
+            <a:r>
+              <a:rPr lang="en-US" sz="2200" dirty="0" smtClean="0">
+                <a:latin typeface="+mn-lt"/>
+                <a:ea typeface="Times New Roman" panose="02020603050405020304" pitchFamily="18" charset="0"/>
+              </a:rPr>
+              <a:t> </a:t>
+            </a:r>
+            <a:r>
+              <a:rPr lang="en-US" sz="2200" dirty="0" err="1" smtClean="0">
+                <a:latin typeface="+mn-lt"/>
+                <a:ea typeface="Times New Roman" panose="02020603050405020304" pitchFamily="18" charset="0"/>
+              </a:rPr>
+              <a:t>privados</a:t>
+            </a:r>
+            <a:r>
+              <a:rPr lang="en-US" sz="2200" dirty="0" smtClean="0">
+                <a:latin typeface="+mn-lt"/>
+                <a:ea typeface="Times New Roman" panose="02020603050405020304" pitchFamily="18" charset="0"/>
+              </a:rPr>
+              <a:t>, el constructor </a:t>
+            </a:r>
+            <a:r>
+              <a:rPr lang="en-US" sz="2200" dirty="0" err="1" smtClean="0">
+                <a:latin typeface="+mn-lt"/>
+                <a:ea typeface="Times New Roman" panose="02020603050405020304" pitchFamily="18" charset="0"/>
+              </a:rPr>
+              <a:t>debe</a:t>
+            </a:r>
+            <a:r>
+              <a:rPr lang="en-US" sz="2200" dirty="0" smtClean="0">
+                <a:latin typeface="+mn-lt"/>
+                <a:ea typeface="Times New Roman" panose="02020603050405020304" pitchFamily="18" charset="0"/>
+              </a:rPr>
+              <a:t> </a:t>
+            </a:r>
+            <a:r>
+              <a:rPr lang="en-US" sz="2200" dirty="0" err="1" smtClean="0">
+                <a:latin typeface="+mn-lt"/>
+                <a:ea typeface="Times New Roman" panose="02020603050405020304" pitchFamily="18" charset="0"/>
+              </a:rPr>
+              <a:t>inicializar</a:t>
+            </a:r>
+            <a:r>
+              <a:rPr lang="en-US" sz="2200" dirty="0" smtClean="0">
+                <a:latin typeface="+mn-lt"/>
+                <a:ea typeface="Times New Roman" panose="02020603050405020304" pitchFamily="18" charset="0"/>
+              </a:rPr>
+              <a:t> </a:t>
+            </a:r>
+            <a:r>
+              <a:rPr lang="en-US" sz="2200" dirty="0" err="1" smtClean="0">
+                <a:latin typeface="+mn-lt"/>
+                <a:ea typeface="Times New Roman" panose="02020603050405020304" pitchFamily="18" charset="0"/>
+              </a:rPr>
+              <a:t>los</a:t>
+            </a:r>
+            <a:r>
+              <a:rPr lang="en-US" sz="2200" dirty="0" smtClean="0">
+                <a:latin typeface="+mn-lt"/>
+                <a:ea typeface="Times New Roman" panose="02020603050405020304" pitchFamily="18" charset="0"/>
+              </a:rPr>
+              <a:t> </a:t>
+            </a:r>
+            <a:r>
+              <a:rPr lang="en-US" sz="2200" dirty="0" err="1" smtClean="0">
+                <a:latin typeface="+mn-lt"/>
+                <a:ea typeface="Times New Roman" panose="02020603050405020304" pitchFamily="18" charset="0"/>
+              </a:rPr>
+              <a:t>atributos</a:t>
+            </a:r>
+            <a:r>
+              <a:rPr lang="en-US" sz="2200" dirty="0" smtClean="0">
+                <a:latin typeface="+mn-lt"/>
+                <a:ea typeface="Times New Roman" panose="02020603050405020304" pitchFamily="18" charset="0"/>
+              </a:rPr>
+              <a:t> de la </a:t>
+            </a:r>
+            <a:r>
+              <a:rPr lang="en-US" sz="2200" dirty="0" err="1" smtClean="0">
+                <a:latin typeface="+mn-lt"/>
+                <a:ea typeface="Times New Roman" panose="02020603050405020304" pitchFamily="18" charset="0"/>
+              </a:rPr>
+              <a:t>clase</a:t>
+            </a:r>
+            <a:r>
+              <a:rPr lang="en-US" sz="2200" dirty="0" smtClean="0">
+                <a:latin typeface="+mn-lt"/>
+                <a:ea typeface="Times New Roman" panose="02020603050405020304" pitchFamily="18" charset="0"/>
+              </a:rPr>
+              <a:t> </a:t>
+            </a:r>
+            <a:r>
+              <a:rPr lang="en-US" sz="2200" dirty="0" err="1" smtClean="0">
+                <a:latin typeface="+mn-lt"/>
+                <a:ea typeface="Times New Roman" panose="02020603050405020304" pitchFamily="18" charset="0"/>
+              </a:rPr>
+              <a:t>correctamente</a:t>
+            </a:r>
+            <a:r>
+              <a:rPr lang="en-US" sz="2200" dirty="0" smtClean="0">
+                <a:latin typeface="+mn-lt"/>
+                <a:ea typeface="Times New Roman" panose="02020603050405020304" pitchFamily="18" charset="0"/>
+              </a:rPr>
+              <a:t>.</a:t>
+            </a:r>
           </a:p>
         </p:txBody>
       </p:sp>
     </p:spTree>
     <p:extLst>
       <p:ext uri="{BB962C8B-B14F-4D97-AF65-F5344CB8AC3E}">
-        <p14:creationId xmlns:p14="http://schemas.microsoft.com/office/powerpoint/2010/main" val="3290798277"/>
+        <p14:creationId xmlns:p14="http://schemas.microsoft.com/office/powerpoint/2010/main" val="3600403802"/>
       </p:ext>
     </p:extLst>
   </p:cSld>
@@ -16302,7 +16784,7 @@
       </p:sp>
       <p:sp>
         <p:nvSpPr>
-          <p:cNvPr id="6" name="Título 1"/>
+          <p:cNvPr id="7" name="Título 1"/>
           <p:cNvSpPr txBox="1">
             <a:spLocks/>
           </p:cNvSpPr>
@@ -16492,7 +16974,7 @@
       </p:sp>
       <p:sp>
         <p:nvSpPr>
-          <p:cNvPr id="7" name="Rectángulo 6"/>
+          <p:cNvPr id="9" name="Rectángulo 8"/>
           <p:cNvSpPr/>
           <p:nvPr/>
         </p:nvSpPr>
@@ -16520,51 +17002,135 @@
           </a:p>
         </p:txBody>
       </p:sp>
-      <p:pic>
-        <p:nvPicPr>
-          <p:cNvPr id="12308" name="Picture 20" descr="Imagen relacionada"/>
-          <p:cNvPicPr>
-            <a:picLocks noChangeAspect="1" noChangeArrowheads="1"/>
-          </p:cNvPicPr>
+      <p:sp>
+        <p:nvSpPr>
+          <p:cNvPr id="10" name="Rectángulo 9"/>
+          <p:cNvSpPr/>
           <p:nvPr/>
-        </p:nvPicPr>
-        <p:blipFill>
-          <a:blip r:embed="rId2">
-            <a:extLst>
-              <a:ext uri="{28A0092B-C50C-407E-A947-70E740481C1C}">
-                <a14:useLocalDpi xmlns:a14="http://schemas.microsoft.com/office/drawing/2010/main" val="0"/>
-              </a:ext>
-            </a:extLst>
-          </a:blip>
-          <a:srcRect/>
-          <a:stretch>
-            <a:fillRect/>
-          </a:stretch>
-        </p:blipFill>
-        <p:spPr bwMode="auto">
+        </p:nvSpPr>
+        <p:spPr>
           <a:xfrm>
-            <a:off x="319953" y="1530835"/>
-            <a:ext cx="8524875" cy="5086350"/>
+            <a:off x="408709" y="1575060"/>
+            <a:ext cx="8524009" cy="4755148"/>
           </a:xfrm>
           <a:prstGeom prst="rect">
             <a:avLst/>
           </a:prstGeom>
-          <a:noFill/>
-          <a:extLst>
-            <a:ext uri="{909E8E84-426E-40DD-AFC4-6F175D3DCCD1}">
-              <a14:hiddenFill xmlns:a14="http://schemas.microsoft.com/office/drawing/2010/main">
-                <a:solidFill>
-                  <a:srgbClr val="FFFFFF"/>
-                </a:solidFill>
-              </a14:hiddenFill>
-            </a:ext>
-          </a:extLst>
         </p:spPr>
-      </p:pic>
+        <p:txBody>
+          <a:bodyPr wrap="square">
+            <a:spAutoFit/>
+          </a:bodyPr>
+          <a:lstStyle/>
+          <a:p>
+            <a:pPr algn="just">
+              <a:spcBef>
+                <a:spcPts val="600"/>
+              </a:spcBef>
+              <a:spcAft>
+                <a:spcPts val="0"/>
+              </a:spcAft>
+            </a:pPr>
+            <a:r>
+              <a:rPr lang="es-ES_tradnl" sz="2400" dirty="0">
+                <a:latin typeface="+mn-lt"/>
+                <a:ea typeface="Times New Roman" panose="02020603050405020304" pitchFamily="18" charset="0"/>
+              </a:rPr>
+              <a:t>Suponga que se quiere diseñar e implementar una clase </a:t>
+            </a:r>
+            <a:r>
+              <a:rPr lang="es-ES_tradnl" sz="2400" i="1" dirty="0" err="1">
+                <a:latin typeface="+mn-lt"/>
+                <a:ea typeface="Times New Roman" panose="02020603050405020304" pitchFamily="18" charset="0"/>
+              </a:rPr>
+              <a:t>PruebaParcial</a:t>
+            </a:r>
+            <a:r>
+              <a:rPr lang="es-ES_tradnl" sz="2400" dirty="0">
+                <a:latin typeface="+mn-lt"/>
+                <a:ea typeface="Times New Roman" panose="02020603050405020304" pitchFamily="18" charset="0"/>
+              </a:rPr>
+              <a:t> que almacene las notas de una prueba parcial y sea capaz de encontrar el promedio de dichas notas, además determinar la cantidad de cada una de las notas.</a:t>
+            </a:r>
+            <a:endParaRPr lang="es-MX" sz="2400" dirty="0">
+              <a:latin typeface="+mn-lt"/>
+              <a:ea typeface="Times New Roman" panose="02020603050405020304" pitchFamily="18" charset="0"/>
+            </a:endParaRPr>
+          </a:p>
+          <a:p>
+            <a:pPr algn="just">
+              <a:spcBef>
+                <a:spcPts val="600"/>
+              </a:spcBef>
+              <a:spcAft>
+                <a:spcPts val="0"/>
+              </a:spcAft>
+            </a:pPr>
+            <a:endParaRPr lang="es-ES_tradnl" sz="2400" dirty="0" smtClean="0">
+              <a:latin typeface="+mn-lt"/>
+              <a:ea typeface="Times New Roman" panose="02020603050405020304" pitchFamily="18" charset="0"/>
+            </a:endParaRPr>
+          </a:p>
+          <a:p>
+            <a:pPr algn="just">
+              <a:spcBef>
+                <a:spcPts val="600"/>
+              </a:spcBef>
+              <a:spcAft>
+                <a:spcPts val="0"/>
+              </a:spcAft>
+            </a:pPr>
+            <a:r>
+              <a:rPr lang="es-ES_tradnl" sz="2400" dirty="0" smtClean="0">
+                <a:latin typeface="+mn-lt"/>
+                <a:ea typeface="Times New Roman" panose="02020603050405020304" pitchFamily="18" charset="0"/>
+              </a:rPr>
+              <a:t>Los </a:t>
+            </a:r>
+            <a:r>
+              <a:rPr lang="es-ES_tradnl" sz="2400" dirty="0">
+                <a:latin typeface="+mn-lt"/>
+                <a:ea typeface="Times New Roman" panose="02020603050405020304" pitchFamily="18" charset="0"/>
+              </a:rPr>
+              <a:t>atributos que se han estudiado hasta el momento permiten almacenar un único dato: un valor entero, o un valor flotante, o un valor doble, o un carácter, o un valor lógico. </a:t>
+            </a:r>
+            <a:endParaRPr lang="es-ES_tradnl" sz="2400" dirty="0" smtClean="0">
+              <a:latin typeface="+mn-lt"/>
+              <a:ea typeface="Times New Roman" panose="02020603050405020304" pitchFamily="18" charset="0"/>
+            </a:endParaRPr>
+          </a:p>
+          <a:p>
+            <a:pPr algn="just">
+              <a:spcBef>
+                <a:spcPts val="600"/>
+              </a:spcBef>
+              <a:spcAft>
+                <a:spcPts val="0"/>
+              </a:spcAft>
+            </a:pPr>
+            <a:endParaRPr lang="es-MX" sz="2400" dirty="0">
+              <a:latin typeface="+mn-lt"/>
+              <a:ea typeface="Times New Roman" panose="02020603050405020304" pitchFamily="18" charset="0"/>
+            </a:endParaRPr>
+          </a:p>
+          <a:p>
+            <a:r>
+              <a:rPr lang="es-ES_tradnl" sz="2400" dirty="0">
+                <a:latin typeface="+mn-lt"/>
+                <a:ea typeface="Times New Roman" panose="02020603050405020304" pitchFamily="18" charset="0"/>
+              </a:rPr>
+              <a:t>Se necesita un tipo de dato donde se pueda almacenar no un único valor sino un conjunto de valores (las notas de todos los estudiantes). </a:t>
+            </a:r>
+            <a:endParaRPr lang="es-MX" sz="2400" dirty="0">
+              <a:latin typeface="+mn-lt"/>
+            </a:endParaRPr>
+          </a:p>
+        </p:txBody>
+      </p:sp>
     </p:spTree>
     <p:extLst>
       <p:ext uri="{BB962C8B-B14F-4D97-AF65-F5344CB8AC3E}">
-        <p14:creationId xmlns:p14="http://schemas.microsoft.com/office/powerpoint/2010/main" val="3673577182"/>
+        <p14:creationId xmlns:p14="http://schemas.microsoft.com/office/powerpoint/2010/main" val="3290798277"/>
       </p:ext>
     </p:extLst>
   </p:cSld>
@@ -16836,98 +17402,51 @@
           </a:p>
         </p:txBody>
       </p:sp>
-      <p:sp>
-        <p:nvSpPr>
-          <p:cNvPr id="8" name="Rectángulo 7"/>
-          <p:cNvSpPr/>
+      <p:pic>
+        <p:nvPicPr>
+          <p:cNvPr id="12308" name="Picture 20" descr="Imagen relacionada"/>
+          <p:cNvPicPr>
+            <a:picLocks noChangeAspect="1" noChangeArrowheads="1"/>
+          </p:cNvPicPr>
           <p:nvPr/>
-        </p:nvSpPr>
-        <p:spPr>
+        </p:nvPicPr>
+        <p:blipFill>
+          <a:blip r:embed="rId2">
+            <a:extLst>
+              <a:ext uri="{28A0092B-C50C-407E-A947-70E740481C1C}">
+                <a14:useLocalDpi xmlns:a14="http://schemas.microsoft.com/office/drawing/2010/main" val="0"/>
+              </a:ext>
+            </a:extLst>
+          </a:blip>
+          <a:srcRect/>
+          <a:stretch>
+            <a:fillRect/>
+          </a:stretch>
+        </p:blipFill>
+        <p:spPr bwMode="auto">
           <a:xfrm>
-            <a:off x="-32904" y="1516980"/>
-            <a:ext cx="8719704" cy="1815882"/>
+            <a:off x="319953" y="1530835"/>
+            <a:ext cx="8524875" cy="5086350"/>
           </a:xfrm>
           <a:prstGeom prst="rect">
             <a:avLst/>
           </a:prstGeom>
+          <a:noFill/>
+          <a:extLst>
+            <a:ext uri="{909E8E84-426E-40DD-AFC4-6F175D3DCCD1}">
+              <a14:hiddenFill xmlns:a14="http://schemas.microsoft.com/office/drawing/2010/main">
+                <a:solidFill>
+                  <a:srgbClr val="FFFFFF"/>
+                </a:solidFill>
+              </a14:hiddenFill>
+            </a:ext>
+          </a:extLst>
         </p:spPr>
-        <p:txBody>
-          <a:bodyPr wrap="square">
-            <a:spAutoFit/>
-          </a:bodyPr>
-          <a:lstStyle/>
-          <a:p>
-            <a:pPr marL="457200" algn="just">
-              <a:spcBef>
-                <a:spcPts val="600"/>
-              </a:spcBef>
-              <a:spcAft>
-                <a:spcPts val="0"/>
-              </a:spcAft>
-            </a:pPr>
-            <a:r>
-              <a:rPr lang="es-ES_tradnl" sz="2800" dirty="0">
-                <a:latin typeface="+mn-lt"/>
-                <a:ea typeface="Times New Roman" panose="02020603050405020304" pitchFamily="18" charset="0"/>
-              </a:rPr>
-              <a:t>Un arreglo es una colección de valores del mismo tipo, asociados a un único nombre de variable, pero que puede ser accedido cada valor de manera independiente.</a:t>
-            </a:r>
-            <a:endParaRPr lang="es-MX" sz="2800" dirty="0">
-              <a:effectLst/>
-              <a:latin typeface="+mn-lt"/>
-              <a:ea typeface="Times New Roman" panose="02020603050405020304" pitchFamily="18" charset="0"/>
-            </a:endParaRPr>
-          </a:p>
-        </p:txBody>
-      </p:sp>
-      <p:sp>
-        <p:nvSpPr>
-          <p:cNvPr id="9" name="Rectángulo 8"/>
-          <p:cNvSpPr/>
-          <p:nvPr/>
-        </p:nvSpPr>
-        <p:spPr>
-          <a:xfrm>
-            <a:off x="436418" y="3667246"/>
-            <a:ext cx="8229600" cy="2246769"/>
-          </a:xfrm>
-          <a:prstGeom prst="rect">
-            <a:avLst/>
-          </a:prstGeom>
-        </p:spPr>
-        <p:txBody>
-          <a:bodyPr wrap="square">
-            <a:spAutoFit/>
-          </a:bodyPr>
-          <a:lstStyle/>
-          <a:p>
-            <a:pPr algn="just">
-              <a:spcBef>
-                <a:spcPts val="600"/>
-              </a:spcBef>
-              <a:spcAft>
-                <a:spcPts val="0"/>
-              </a:spcAft>
-            </a:pPr>
-            <a:r>
-              <a:rPr lang="es-ES_tradnl" sz="2800" dirty="0">
-                <a:latin typeface="+mn-lt"/>
-                <a:ea typeface="Times New Roman" panose="02020603050405020304" pitchFamily="18" charset="0"/>
-              </a:rPr>
-              <a:t>Un elemento del arreglo es uno de los valores que se almacena en el arreglo. Como se observa los elementos se identifican por su índice. Los índices comienzan en 0 y el último índice es la longitud del arreglo menos uno.</a:t>
-            </a:r>
-            <a:endParaRPr lang="es-MX" sz="2800" dirty="0">
-              <a:effectLst/>
-              <a:latin typeface="+mn-lt"/>
-              <a:ea typeface="Times New Roman" panose="02020603050405020304" pitchFamily="18" charset="0"/>
-            </a:endParaRPr>
-          </a:p>
-        </p:txBody>
-      </p:sp>
+      </p:pic>
     </p:spTree>
     <p:extLst>
       <p:ext uri="{BB962C8B-B14F-4D97-AF65-F5344CB8AC3E}">
-        <p14:creationId xmlns:p14="http://schemas.microsoft.com/office/powerpoint/2010/main" val="932282069"/>
+        <p14:creationId xmlns:p14="http://schemas.microsoft.com/office/powerpoint/2010/main" val="3673577182"/>
       </p:ext>
     </p:extLst>
   </p:cSld>
@@ -17207,8 +17726,8 @@
         </p:nvSpPr>
         <p:spPr>
           <a:xfrm>
-            <a:off x="467591" y="1516980"/>
-            <a:ext cx="8229600" cy="4632037"/>
+            <a:off x="-32904" y="1516980"/>
+            <a:ext cx="8719704" cy="1815882"/>
           </a:xfrm>
           <a:prstGeom prst="rect">
             <a:avLst/>
@@ -17220,7 +17739,7 @@
           </a:bodyPr>
           <a:lstStyle/>
           <a:p>
-            <a:pPr algn="just">
+            <a:pPr marL="457200" algn="just">
               <a:spcBef>
                 <a:spcPts val="600"/>
               </a:spcBef>
@@ -17229,54 +17748,42 @@
               </a:spcAft>
             </a:pPr>
             <a:r>
-              <a:rPr lang="es-ES_tradnl" sz="2000" dirty="0">
-                <a:latin typeface="+mn-lt"/>
-                <a:ea typeface="Times New Roman" panose="02020603050405020304" pitchFamily="18" charset="0"/>
-              </a:rPr>
-              <a:t>En Java un arreglo es un objeto </a:t>
-            </a:r>
-            <a:r>
-              <a:rPr lang="es-ES_tradnl" sz="2000" dirty="0" smtClean="0">
-                <a:latin typeface="+mn-lt"/>
-                <a:ea typeface="Times New Roman" panose="02020603050405020304" pitchFamily="18" charset="0"/>
-              </a:rPr>
-              <a:t>especial.</a:t>
-            </a:r>
-            <a:r>
-              <a:rPr lang="es-MX" sz="2000" dirty="0" smtClean="0">
-                <a:latin typeface="+mn-lt"/>
-                <a:ea typeface="Times New Roman" panose="02020603050405020304" pitchFamily="18" charset="0"/>
-              </a:rPr>
-              <a:t> </a:t>
-            </a:r>
-            <a:r>
-              <a:rPr lang="es-ES_tradnl" sz="2000" dirty="0" smtClean="0">
-                <a:latin typeface="+mn-lt"/>
-                <a:ea typeface="Times New Roman" panose="02020603050405020304" pitchFamily="18" charset="0"/>
-              </a:rPr>
-              <a:t>Para </a:t>
-            </a:r>
-            <a:r>
-              <a:rPr lang="es-ES_tradnl" sz="2000" b="1" dirty="0">
-                <a:latin typeface="+mn-lt"/>
-                <a:ea typeface="Times New Roman" panose="02020603050405020304" pitchFamily="18" charset="0"/>
-              </a:rPr>
-              <a:t>declarar</a:t>
-            </a:r>
-            <a:r>
-              <a:rPr lang="es-ES_tradnl" sz="2000" dirty="0">
-                <a:latin typeface="+mn-lt"/>
-                <a:ea typeface="Times New Roman" panose="02020603050405020304" pitchFamily="18" charset="0"/>
-              </a:rPr>
-              <a:t> un arreglo se pueden utilizar las siguientes formas:</a:t>
-            </a:r>
-            <a:endParaRPr lang="es-MX" sz="2000" dirty="0">
+              <a:rPr lang="es-ES_tradnl" sz="2800" dirty="0">
+                <a:latin typeface="+mn-lt"/>
+                <a:ea typeface="Times New Roman" panose="02020603050405020304" pitchFamily="18" charset="0"/>
+              </a:rPr>
+              <a:t>Un arreglo es una colección de valores del mismo tipo, asociados a un único nombre de variable, pero que puede ser accedido cada valor de manera independiente.</a:t>
+            </a:r>
+            <a:endParaRPr lang="es-MX" sz="2800" dirty="0">
+              <a:effectLst/>
               <a:latin typeface="+mn-lt"/>
               <a:ea typeface="Times New Roman" panose="02020603050405020304" pitchFamily="18" charset="0"/>
             </a:endParaRPr>
           </a:p>
-          <a:p>
-            <a:pPr marL="457200" algn="just">
+        </p:txBody>
+      </p:sp>
+      <p:sp>
+        <p:nvSpPr>
+          <p:cNvPr id="9" name="Rectángulo 8"/>
+          <p:cNvSpPr/>
+          <p:nvPr/>
+        </p:nvSpPr>
+        <p:spPr>
+          <a:xfrm>
+            <a:off x="436418" y="3667246"/>
+            <a:ext cx="8229600" cy="2246769"/>
+          </a:xfrm>
+          <a:prstGeom prst="rect">
+            <a:avLst/>
+          </a:prstGeom>
+        </p:spPr>
+        <p:txBody>
+          <a:bodyPr wrap="square">
+            <a:spAutoFit/>
+          </a:bodyPr>
+          <a:lstStyle/>
+          <a:p>
+            <a:pPr algn="just">
               <a:spcBef>
                 <a:spcPts val="600"/>
               </a:spcBef>
@@ -17285,181 +17792,13 @@
               </a:spcAft>
             </a:pPr>
             <a:r>
-              <a:rPr lang="es-ES_tradnl" sz="2000" i="1" dirty="0">
-                <a:latin typeface="+mn-lt"/>
-                <a:ea typeface="Times New Roman" panose="02020603050405020304" pitchFamily="18" charset="0"/>
-              </a:rPr>
-              <a:t>&lt;tipo</a:t>
-            </a:r>
-            <a:r>
-              <a:rPr lang="es-ES_tradnl" sz="2000" i="1" dirty="0" smtClean="0">
-                <a:latin typeface="+mn-lt"/>
-                <a:ea typeface="Times New Roman" panose="02020603050405020304" pitchFamily="18" charset="0"/>
-              </a:rPr>
-              <a:t>&gt;[ ] </a:t>
-            </a:r>
-            <a:r>
-              <a:rPr lang="es-ES_tradnl" sz="2000" i="1" dirty="0">
-                <a:latin typeface="+mn-lt"/>
-                <a:ea typeface="Times New Roman" panose="02020603050405020304" pitchFamily="18" charset="0"/>
-              </a:rPr>
-              <a:t>&lt;nombre&gt;;</a:t>
-            </a:r>
-            <a:endParaRPr lang="es-MX" sz="2000" i="1" dirty="0">
-              <a:latin typeface="+mn-lt"/>
-              <a:ea typeface="Times New Roman" panose="02020603050405020304" pitchFamily="18" charset="0"/>
-            </a:endParaRPr>
-          </a:p>
-          <a:p>
-            <a:pPr marL="457200" algn="just">
-              <a:spcBef>
-                <a:spcPts val="600"/>
-              </a:spcBef>
-              <a:spcAft>
-                <a:spcPts val="0"/>
-              </a:spcAft>
-            </a:pPr>
-            <a:r>
-              <a:rPr lang="es-ES_tradnl" sz="2000" i="1" dirty="0">
-                <a:latin typeface="+mn-lt"/>
-                <a:ea typeface="Times New Roman" panose="02020603050405020304" pitchFamily="18" charset="0"/>
-              </a:rPr>
-              <a:t>&lt;tipo&gt; &lt;nombre&gt; </a:t>
-            </a:r>
-            <a:r>
-              <a:rPr lang="es-ES_tradnl" sz="2000" i="1" dirty="0" smtClean="0">
-                <a:latin typeface="+mn-lt"/>
-                <a:ea typeface="Times New Roman" panose="02020603050405020304" pitchFamily="18" charset="0"/>
-              </a:rPr>
-              <a:t>[ ];</a:t>
-            </a:r>
-            <a:endParaRPr lang="es-MX" sz="2000" i="1" dirty="0">
-              <a:latin typeface="+mn-lt"/>
-              <a:ea typeface="Times New Roman" panose="02020603050405020304" pitchFamily="18" charset="0"/>
-            </a:endParaRPr>
-          </a:p>
-          <a:p>
-            <a:pPr algn="just">
-              <a:spcBef>
-                <a:spcPts val="600"/>
-              </a:spcBef>
-              <a:spcAft>
-                <a:spcPts val="0"/>
-              </a:spcAft>
-            </a:pPr>
-            <a:r>
-              <a:rPr lang="es-ES_tradnl" sz="2000" dirty="0">
-                <a:latin typeface="+mn-lt"/>
-                <a:ea typeface="Times New Roman" panose="02020603050405020304" pitchFamily="18" charset="0"/>
-              </a:rPr>
-              <a:t>La primera forma es preferible a la segunda, por un problema de claridad. </a:t>
-            </a:r>
-            <a:endParaRPr lang="es-MX" sz="2000" dirty="0">
-              <a:latin typeface="+mn-lt"/>
-              <a:ea typeface="Times New Roman" panose="02020603050405020304" pitchFamily="18" charset="0"/>
-            </a:endParaRPr>
-          </a:p>
-          <a:p>
-            <a:pPr algn="just">
-              <a:spcBef>
-                <a:spcPts val="600"/>
-              </a:spcBef>
-              <a:spcAft>
-                <a:spcPts val="0"/>
-              </a:spcAft>
-            </a:pPr>
-            <a:r>
-              <a:rPr lang="es-ES_tradnl" sz="2000" dirty="0">
-                <a:latin typeface="+mn-lt"/>
-                <a:ea typeface="Times New Roman" panose="02020603050405020304" pitchFamily="18" charset="0"/>
-              </a:rPr>
-              <a:t>Ambas indicas que se declara un arreglo con el nombre que se indica y cuyos elementos son del tipo </a:t>
-            </a:r>
-            <a:r>
-              <a:rPr lang="es-ES_tradnl" sz="2000" dirty="0" smtClean="0">
-                <a:latin typeface="+mn-lt"/>
-                <a:ea typeface="Times New Roman" panose="02020603050405020304" pitchFamily="18" charset="0"/>
-              </a:rPr>
-              <a:t>especificado. En </a:t>
-            </a:r>
-            <a:r>
-              <a:rPr lang="es-ES_tradnl" sz="2000" dirty="0">
-                <a:latin typeface="+mn-lt"/>
-                <a:ea typeface="Times New Roman" panose="02020603050405020304" pitchFamily="18" charset="0"/>
-              </a:rPr>
-              <a:t>el caso de los arreglos los corchetes no significan opcionalidad, sino son parte de la sintaxis.</a:t>
-            </a:r>
-            <a:endParaRPr lang="es-MX" sz="2000" dirty="0">
-              <a:latin typeface="+mn-lt"/>
-              <a:ea typeface="Times New Roman" panose="02020603050405020304" pitchFamily="18" charset="0"/>
-            </a:endParaRPr>
-          </a:p>
-          <a:p>
-            <a:pPr lvl="1" algn="just">
-              <a:spcBef>
-                <a:spcPts val="600"/>
-              </a:spcBef>
-              <a:spcAft>
-                <a:spcPts val="0"/>
-              </a:spcAft>
-            </a:pPr>
-            <a:r>
-              <a:rPr lang="es-ES_tradnl" sz="2000" b="1" dirty="0">
-                <a:latin typeface="+mn-lt"/>
-                <a:ea typeface="Times New Roman" panose="02020603050405020304" pitchFamily="18" charset="0"/>
-              </a:rPr>
-              <a:t>Ejemplo:</a:t>
-            </a:r>
-            <a:endParaRPr lang="es-MX" sz="2000" b="1" dirty="0">
-              <a:latin typeface="+mn-lt"/>
-              <a:ea typeface="Times New Roman" panose="02020603050405020304" pitchFamily="18" charset="0"/>
-            </a:endParaRPr>
-          </a:p>
-          <a:p>
-            <a:pPr marL="457200" algn="just">
-              <a:spcBef>
-                <a:spcPts val="600"/>
-              </a:spcBef>
-              <a:spcAft>
-                <a:spcPts val="0"/>
-              </a:spcAft>
-            </a:pPr>
-            <a:r>
-              <a:rPr lang="es-ES_tradnl" sz="2000" dirty="0" err="1">
-                <a:latin typeface="+mn-lt"/>
-                <a:ea typeface="Times New Roman" panose="02020603050405020304" pitchFamily="18" charset="0"/>
-              </a:rPr>
-              <a:t>int</a:t>
-            </a:r>
-            <a:r>
-              <a:rPr lang="es-ES_tradnl" sz="2000" dirty="0">
-                <a:latin typeface="+mn-lt"/>
-                <a:ea typeface="Times New Roman" panose="02020603050405020304" pitchFamily="18" charset="0"/>
-              </a:rPr>
-              <a:t>[] notas;</a:t>
-            </a:r>
-            <a:endParaRPr lang="es-MX" sz="2000" dirty="0">
-              <a:latin typeface="+mn-lt"/>
-              <a:ea typeface="Times New Roman" panose="02020603050405020304" pitchFamily="18" charset="0"/>
-            </a:endParaRPr>
-          </a:p>
-          <a:p>
-            <a:pPr marL="457200" algn="just">
-              <a:spcBef>
-                <a:spcPts val="600"/>
-              </a:spcBef>
-              <a:spcAft>
-                <a:spcPts val="0"/>
-              </a:spcAft>
-            </a:pPr>
-            <a:r>
-              <a:rPr lang="es-ES_tradnl" sz="2000" dirty="0">
-                <a:latin typeface="+mn-lt"/>
-                <a:ea typeface="Times New Roman" panose="02020603050405020304" pitchFamily="18" charset="0"/>
-              </a:rPr>
-              <a:t>Declara un arreglo que se llama “notas”, cuyos elementos son valores enteros.</a:t>
-            </a:r>
-            <a:endParaRPr lang="es-MX" sz="2000" dirty="0">
+              <a:rPr lang="es-ES_tradnl" sz="2800" dirty="0">
+                <a:latin typeface="+mn-lt"/>
+                <a:ea typeface="Times New Roman" panose="02020603050405020304" pitchFamily="18" charset="0"/>
+              </a:rPr>
+              <a:t>Un elemento del arreglo es uno de los valores que se almacena en el arreglo. Como se observa los elementos se identifican por su índice. Los índices comienzan en 0 y el último índice es la longitud del arreglo menos uno.</a:t>
+            </a:r>
+            <a:endParaRPr lang="es-MX" sz="2800" dirty="0">
               <a:effectLst/>
               <a:latin typeface="+mn-lt"/>
               <a:ea typeface="Times New Roman" panose="02020603050405020304" pitchFamily="18" charset="0"/>
@@ -17470,7 +17809,7 @@
     </p:spTree>
     <p:extLst>
       <p:ext uri="{BB962C8B-B14F-4D97-AF65-F5344CB8AC3E}">
-        <p14:creationId xmlns:p14="http://schemas.microsoft.com/office/powerpoint/2010/main" val="3421583694"/>
+        <p14:creationId xmlns:p14="http://schemas.microsoft.com/office/powerpoint/2010/main" val="932282069"/>
       </p:ext>
     </p:extLst>
   </p:cSld>
@@ -17750,8 +18089,8 @@
         </p:nvSpPr>
         <p:spPr>
           <a:xfrm>
-            <a:off x="457200" y="1621227"/>
-            <a:ext cx="8229600" cy="4708981"/>
+            <a:off x="467591" y="1516980"/>
+            <a:ext cx="8229600" cy="4632037"/>
           </a:xfrm>
           <a:prstGeom prst="rect">
             <a:avLst/>
@@ -17772,44 +18111,48 @@
               </a:spcAft>
             </a:pPr>
             <a:r>
-              <a:rPr lang="es-ES_tradnl" sz="2800" dirty="0">
-                <a:latin typeface="+mn-lt"/>
-                <a:ea typeface="Times New Roman" panose="02020603050405020304" pitchFamily="18" charset="0"/>
-              </a:rPr>
-              <a:t>Con esto se está declarando el arreglo, pero aún no se ha reservado memoria para el mismo. Para reservar memoria hay que utilizar el operador </a:t>
-            </a:r>
-            <a:r>
-              <a:rPr lang="es-ES_tradnl" sz="2800" b="1" dirty="0">
-                <a:latin typeface="+mn-lt"/>
-                <a:ea typeface="Times New Roman" panose="02020603050405020304" pitchFamily="18" charset="0"/>
-              </a:rPr>
-              <a:t>new</a:t>
-            </a:r>
-            <a:r>
-              <a:rPr lang="es-ES_tradnl" sz="2800" dirty="0">
-                <a:latin typeface="+mn-lt"/>
-                <a:ea typeface="Times New Roman" panose="02020603050405020304" pitchFamily="18" charset="0"/>
-              </a:rPr>
-              <a:t> (como para el resto de los objetos</a:t>
-            </a:r>
-            <a:r>
-              <a:rPr lang="es-ES_tradnl" sz="2800" dirty="0" smtClean="0">
-                <a:latin typeface="+mn-lt"/>
-                <a:ea typeface="Times New Roman" panose="02020603050405020304" pitchFamily="18" charset="0"/>
-              </a:rPr>
-              <a:t>).</a:t>
-            </a:r>
-          </a:p>
-          <a:p>
-            <a:pPr algn="just">
-              <a:spcBef>
-                <a:spcPts val="600"/>
-              </a:spcBef>
-              <a:spcAft>
-                <a:spcPts val="0"/>
-              </a:spcAft>
-            </a:pPr>
-            <a:endParaRPr lang="es-MX" sz="2800" dirty="0">
+              <a:rPr lang="es-ES_tradnl" sz="2000" dirty="0">
+                <a:latin typeface="+mn-lt"/>
+                <a:ea typeface="Times New Roman" panose="02020603050405020304" pitchFamily="18" charset="0"/>
+              </a:rPr>
+              <a:t>En Java un arreglo es un objeto </a:t>
+            </a:r>
+            <a:r>
+              <a:rPr lang="es-ES_tradnl" sz="2000" dirty="0" smtClean="0">
+                <a:latin typeface="+mn-lt"/>
+                <a:ea typeface="Times New Roman" panose="02020603050405020304" pitchFamily="18" charset="0"/>
+              </a:rPr>
+              <a:t>especial.</a:t>
+            </a:r>
+            <a:r>
+              <a:rPr lang="es-MX" sz="2000" dirty="0" smtClean="0">
+                <a:latin typeface="+mn-lt"/>
+                <a:ea typeface="Times New Roman" panose="02020603050405020304" pitchFamily="18" charset="0"/>
+              </a:rPr>
+              <a:t> </a:t>
+            </a:r>
+            <a:r>
+              <a:rPr lang="es-ES_tradnl" sz="2000" dirty="0" smtClean="0">
+                <a:latin typeface="+mn-lt"/>
+                <a:ea typeface="Times New Roman" panose="02020603050405020304" pitchFamily="18" charset="0"/>
+              </a:rPr>
+              <a:t>Para </a:t>
+            </a:r>
+            <a:r>
+              <a:rPr lang="es-ES_tradnl" sz="2000" b="1" dirty="0">
+                <a:latin typeface="+mn-lt"/>
+                <a:ea typeface="Times New Roman" panose="02020603050405020304" pitchFamily="18" charset="0"/>
+              </a:rPr>
+              <a:t>declarar</a:t>
+            </a:r>
+            <a:r>
+              <a:rPr lang="es-ES_tradnl" sz="2000" dirty="0">
+                <a:latin typeface="+mn-lt"/>
+                <a:ea typeface="Times New Roman" panose="02020603050405020304" pitchFamily="18" charset="0"/>
+              </a:rPr>
+              <a:t> un arreglo se pueden utilizar las siguientes formas:</a:t>
+            </a:r>
+            <a:endParaRPr lang="es-MX" sz="2000" dirty="0">
               <a:latin typeface="+mn-lt"/>
               <a:ea typeface="Times New Roman" panose="02020603050405020304" pitchFamily="18" charset="0"/>
             </a:endParaRPr>
@@ -17824,77 +18167,60 @@
               </a:spcAft>
             </a:pPr>
             <a:r>
-              <a:rPr lang="es-ES_tradnl" sz="2800" dirty="0">
-                <a:latin typeface="+mn-lt"/>
-                <a:ea typeface="Times New Roman" panose="02020603050405020304" pitchFamily="18" charset="0"/>
-              </a:rPr>
-              <a:t>&lt;nombre&gt; = </a:t>
-            </a:r>
-            <a:r>
-              <a:rPr lang="es-ES_tradnl" sz="2800" b="1" dirty="0">
-                <a:latin typeface="+mn-lt"/>
-                <a:ea typeface="Times New Roman" panose="02020603050405020304" pitchFamily="18" charset="0"/>
-              </a:rPr>
-              <a:t>new</a:t>
-            </a:r>
-            <a:r>
-              <a:rPr lang="es-ES_tradnl" sz="2800" dirty="0">
-                <a:latin typeface="+mn-lt"/>
-                <a:ea typeface="Times New Roman" panose="02020603050405020304" pitchFamily="18" charset="0"/>
-              </a:rPr>
-              <a:t> &lt;tipo&gt; </a:t>
-            </a:r>
-            <a:r>
-              <a:rPr lang="es-ES_tradnl" sz="2800" b="1" dirty="0">
-                <a:latin typeface="+mn-lt"/>
-                <a:ea typeface="Times New Roman" panose="02020603050405020304" pitchFamily="18" charset="0"/>
-              </a:rPr>
-              <a:t>[</a:t>
-            </a:r>
-            <a:r>
-              <a:rPr lang="es-ES_tradnl" sz="2800" dirty="0">
-                <a:latin typeface="+mn-lt"/>
-                <a:ea typeface="Times New Roman" panose="02020603050405020304" pitchFamily="18" charset="0"/>
-              </a:rPr>
-              <a:t>&lt;valor</a:t>
-            </a:r>
-            <a:r>
-              <a:rPr lang="es-ES_tradnl" sz="2800" dirty="0" smtClean="0">
-                <a:latin typeface="+mn-lt"/>
-                <a:ea typeface="Times New Roman" panose="02020603050405020304" pitchFamily="18" charset="0"/>
-              </a:rPr>
-              <a:t>&gt;</a:t>
-            </a:r>
-            <a:r>
-              <a:rPr lang="es-ES_tradnl" sz="2800" b="1" dirty="0" smtClean="0">
-                <a:latin typeface="+mn-lt"/>
-                <a:ea typeface="Times New Roman" panose="02020603050405020304" pitchFamily="18" charset="0"/>
-              </a:rPr>
-              <a:t>]</a:t>
-            </a:r>
-            <a:r>
-              <a:rPr lang="es-ES_tradnl" sz="2800" dirty="0" smtClean="0">
-                <a:latin typeface="+mn-lt"/>
-                <a:ea typeface="Times New Roman" panose="02020603050405020304" pitchFamily="18" charset="0"/>
-              </a:rPr>
-              <a:t>;</a:t>
-            </a:r>
-          </a:p>
-          <a:p>
-            <a:pPr marL="457200" algn="just">
-              <a:spcBef>
-                <a:spcPts val="600"/>
-              </a:spcBef>
-              <a:spcAft>
-                <a:spcPts val="0"/>
-              </a:spcAft>
-            </a:pPr>
-            <a:endParaRPr lang="es-MX" sz="2800" dirty="0">
+              <a:rPr lang="es-ES_tradnl" sz="2000" i="1" dirty="0">
+                <a:latin typeface="+mn-lt"/>
+                <a:ea typeface="Times New Roman" panose="02020603050405020304" pitchFamily="18" charset="0"/>
+              </a:rPr>
+              <a:t>&lt;tipo</a:t>
+            </a:r>
+            <a:r>
+              <a:rPr lang="es-ES_tradnl" sz="2000" i="1" dirty="0" smtClean="0">
+                <a:latin typeface="+mn-lt"/>
+                <a:ea typeface="Times New Roman" panose="02020603050405020304" pitchFamily="18" charset="0"/>
+              </a:rPr>
+              <a:t>&gt;[ ] </a:t>
+            </a:r>
+            <a:r>
+              <a:rPr lang="es-ES_tradnl" sz="2000" i="1" dirty="0">
+                <a:latin typeface="+mn-lt"/>
+                <a:ea typeface="Times New Roman" panose="02020603050405020304" pitchFamily="18" charset="0"/>
+              </a:rPr>
+              <a:t>&lt;nombre&gt;;</a:t>
+            </a:r>
+            <a:endParaRPr lang="es-MX" sz="2000" i="1" dirty="0">
               <a:latin typeface="+mn-lt"/>
               <a:ea typeface="Times New Roman" panose="02020603050405020304" pitchFamily="18" charset="0"/>
             </a:endParaRPr>
           </a:p>
           <a:p>
+            <a:pPr marL="457200" algn="just">
+              <a:spcBef>
+                <a:spcPts val="600"/>
+              </a:spcBef>
+              <a:spcAft>
+                <a:spcPts val="0"/>
+              </a:spcAft>
+            </a:pPr>
+            <a:r>
+              <a:rPr lang="es-ES_tradnl" sz="2000" i="1" dirty="0">
+                <a:latin typeface="+mn-lt"/>
+                <a:ea typeface="Times New Roman" panose="02020603050405020304" pitchFamily="18" charset="0"/>
+              </a:rPr>
+              <a:t>&lt;tipo&gt; &lt;nombre&gt; </a:t>
+            </a:r>
+            <a:r>
+              <a:rPr lang="es-ES_tradnl" sz="2000" i="1" dirty="0" smtClean="0">
+                <a:latin typeface="+mn-lt"/>
+                <a:ea typeface="Times New Roman" panose="02020603050405020304" pitchFamily="18" charset="0"/>
+              </a:rPr>
+              <a:t>[ ];</a:t>
+            </a:r>
+            <a:endParaRPr lang="es-MX" sz="2000" i="1" dirty="0">
+              <a:latin typeface="+mn-lt"/>
+              <a:ea typeface="Times New Roman" panose="02020603050405020304" pitchFamily="18" charset="0"/>
+            </a:endParaRPr>
+          </a:p>
+          <a:p>
             <a:pPr algn="just">
               <a:spcBef>
                 <a:spcPts val="600"/>
@@ -17904,13 +18230,118 @@
               </a:spcAft>
             </a:pPr>
             <a:r>
-              <a:rPr lang="es-ES_tradnl" sz="2800" dirty="0">
-                <a:latin typeface="+mn-lt"/>
-                <a:ea typeface="Times New Roman" panose="02020603050405020304" pitchFamily="18" charset="0"/>
-              </a:rPr>
-              <a:t>El nombre y el tipo coinciden con los declarados. El valor es la cantidad de elementos que tendrá el arreglo (su longitud).</a:t>
-            </a:r>
-            <a:endParaRPr lang="es-MX" sz="2800" dirty="0">
+              <a:rPr lang="es-ES_tradnl" sz="2000" dirty="0">
+                <a:latin typeface="+mn-lt"/>
+                <a:ea typeface="Times New Roman" panose="02020603050405020304" pitchFamily="18" charset="0"/>
+              </a:rPr>
+              <a:t>La primera forma es preferible a la segunda, por un problema de claridad. </a:t>
+            </a:r>
+            <a:endParaRPr lang="es-MX" sz="2000" dirty="0">
+              <a:latin typeface="+mn-lt"/>
+              <a:ea typeface="Times New Roman" panose="02020603050405020304" pitchFamily="18" charset="0"/>
+            </a:endParaRPr>
+          </a:p>
+          <a:p>
+            <a:pPr algn="just">
+              <a:spcBef>
+                <a:spcPts val="600"/>
+              </a:spcBef>
+              <a:spcAft>
+                <a:spcPts val="0"/>
+              </a:spcAft>
+            </a:pPr>
+            <a:r>
+              <a:rPr lang="es-ES_tradnl" sz="2000" dirty="0">
+                <a:latin typeface="+mn-lt"/>
+                <a:ea typeface="Times New Roman" panose="02020603050405020304" pitchFamily="18" charset="0"/>
+              </a:rPr>
+              <a:t>Ambas indicas que se declara un arreglo con el nombre que se indica y cuyos elementos son del tipo </a:t>
+            </a:r>
+            <a:r>
+              <a:rPr lang="es-ES_tradnl" sz="2000" dirty="0" smtClean="0">
+                <a:latin typeface="+mn-lt"/>
+                <a:ea typeface="Times New Roman" panose="02020603050405020304" pitchFamily="18" charset="0"/>
+              </a:rPr>
+              <a:t>especificado. En </a:t>
+            </a:r>
+            <a:r>
+              <a:rPr lang="es-ES_tradnl" sz="2000" dirty="0">
+                <a:latin typeface="+mn-lt"/>
+                <a:ea typeface="Times New Roman" panose="02020603050405020304" pitchFamily="18" charset="0"/>
+              </a:rPr>
+              <a:t>el caso de los arreglos los corchetes no significan opcionalidad, sino son parte de la sintaxis.</a:t>
+            </a:r>
+            <a:endParaRPr lang="es-MX" sz="2000" dirty="0">
+              <a:latin typeface="+mn-lt"/>
+              <a:ea typeface="Times New Roman" panose="02020603050405020304" pitchFamily="18" charset="0"/>
+            </a:endParaRPr>
+          </a:p>
+          <a:p>
+            <a:pPr lvl="1" algn="just">
+              <a:spcBef>
+                <a:spcPts val="600"/>
+              </a:spcBef>
+              <a:spcAft>
+                <a:spcPts val="0"/>
+              </a:spcAft>
+            </a:pPr>
+            <a:r>
+              <a:rPr lang="es-ES_tradnl" sz="2000" b="1" dirty="0">
+                <a:latin typeface="+mn-lt"/>
+                <a:ea typeface="Times New Roman" panose="02020603050405020304" pitchFamily="18" charset="0"/>
+              </a:rPr>
+              <a:t>Ejemplo:</a:t>
+            </a:r>
+            <a:endParaRPr lang="es-MX" sz="2000" b="1" dirty="0">
+              <a:latin typeface="+mn-lt"/>
+              <a:ea typeface="Times New Roman" panose="02020603050405020304" pitchFamily="18" charset="0"/>
+            </a:endParaRPr>
+          </a:p>
+          <a:p>
+            <a:pPr marL="457200" algn="just">
+              <a:spcBef>
+                <a:spcPts val="600"/>
+              </a:spcBef>
+              <a:spcAft>
+                <a:spcPts val="0"/>
+              </a:spcAft>
+            </a:pPr>
+            <a:r>
+              <a:rPr lang="es-ES_tradnl" sz="2000" dirty="0" err="1">
+                <a:latin typeface="+mn-lt"/>
+                <a:ea typeface="Times New Roman" panose="02020603050405020304" pitchFamily="18" charset="0"/>
+              </a:rPr>
+              <a:t>int</a:t>
+            </a:r>
+            <a:r>
+              <a:rPr lang="es-ES_tradnl" sz="2000" dirty="0">
+                <a:latin typeface="+mn-lt"/>
+                <a:ea typeface="Times New Roman" panose="02020603050405020304" pitchFamily="18" charset="0"/>
+              </a:rPr>
+              <a:t>[] notas;</a:t>
+            </a:r>
+            <a:endParaRPr lang="es-MX" sz="2000" dirty="0">
+              <a:latin typeface="+mn-lt"/>
+              <a:ea typeface="Times New Roman" panose="02020603050405020304" pitchFamily="18" charset="0"/>
+            </a:endParaRPr>
+          </a:p>
+          <a:p>
+            <a:pPr marL="457200" algn="just">
+              <a:spcBef>
+                <a:spcPts val="600"/>
+              </a:spcBef>
+              <a:spcAft>
+                <a:spcPts val="0"/>
+              </a:spcAft>
+            </a:pPr>
+            <a:r>
+              <a:rPr lang="es-ES_tradnl" sz="2000" dirty="0">
+                <a:latin typeface="+mn-lt"/>
+                <a:ea typeface="Times New Roman" panose="02020603050405020304" pitchFamily="18" charset="0"/>
+              </a:rPr>
+              <a:t>Declara un arreglo que se llama “notas”, cuyos elementos son valores enteros.</a:t>
+            </a:r>
+            <a:endParaRPr lang="es-MX" sz="2000" dirty="0">
               <a:effectLst/>
               <a:latin typeface="+mn-lt"/>
               <a:ea typeface="Times New Roman" panose="02020603050405020304" pitchFamily="18" charset="0"/>
@@ -17921,7 +18352,7 @@
     </p:spTree>
     <p:extLst>
       <p:ext uri="{BB962C8B-B14F-4D97-AF65-F5344CB8AC3E}">
-        <p14:creationId xmlns:p14="http://schemas.microsoft.com/office/powerpoint/2010/main" val="1023925797"/>
+        <p14:creationId xmlns:p14="http://schemas.microsoft.com/office/powerpoint/2010/main" val="3421583694"/>
       </p:ext>
     </p:extLst>
   </p:cSld>
@@ -18187,7 +18618,7 @@
             <a:pPr lvl="1" eaLnBrk="1" hangingPunct="1"/>
             <a:r>
               <a:rPr lang="es-ES_tradnl" altLang="es-MX" sz="2400" b="1" dirty="0" smtClean="0"/>
-              <a:t>Ejemplo:</a:t>
+              <a:t>Arreglos:</a:t>
             </a:r>
             <a:endParaRPr lang="es-ES_tradnl" altLang="es-MX" sz="2400" b="1" dirty="0"/>
           </a:p>
@@ -18201,8 +18632,8 @@
         </p:nvSpPr>
         <p:spPr>
           <a:xfrm>
-            <a:off x="0" y="1516980"/>
-            <a:ext cx="8686800" cy="2400657"/>
+            <a:off x="457200" y="1621227"/>
+            <a:ext cx="8229600" cy="4708981"/>
           </a:xfrm>
           <a:prstGeom prst="rect">
             <a:avLst/>
@@ -18214,7 +18645,7 @@
           </a:bodyPr>
           <a:lstStyle/>
           <a:p>
-            <a:pPr marL="457200" algn="just">
+            <a:pPr algn="just">
               <a:spcBef>
                 <a:spcPts val="600"/>
               </a:spcBef>
@@ -18223,50 +18654,36 @@
               </a:spcAft>
             </a:pPr>
             <a:r>
-              <a:rPr lang="es-ES_tradnl" sz="2800" i="1" dirty="0">
-                <a:latin typeface="+mn-lt"/>
-                <a:ea typeface="Times New Roman" panose="02020603050405020304" pitchFamily="18" charset="0"/>
-              </a:rPr>
-              <a:t>notas = </a:t>
-            </a:r>
-            <a:r>
-              <a:rPr lang="es-ES_tradnl" sz="2800" b="1" i="1" dirty="0">
+              <a:rPr lang="es-ES_tradnl" sz="2800" dirty="0">
+                <a:latin typeface="+mn-lt"/>
+                <a:ea typeface="Times New Roman" panose="02020603050405020304" pitchFamily="18" charset="0"/>
+              </a:rPr>
+              <a:t>Con esto se está declarando el arreglo, pero aún no se ha reservado memoria para el mismo. Para reservar memoria hay que utilizar el operador </a:t>
+            </a:r>
+            <a:r>
+              <a:rPr lang="es-ES_tradnl" sz="2800" b="1" dirty="0">
                 <a:latin typeface="+mn-lt"/>
                 <a:ea typeface="Times New Roman" panose="02020603050405020304" pitchFamily="18" charset="0"/>
               </a:rPr>
               <a:t>new</a:t>
             </a:r>
             <a:r>
-              <a:rPr lang="es-ES_tradnl" sz="2800" i="1" dirty="0">
-                <a:latin typeface="+mn-lt"/>
-                <a:ea typeface="Times New Roman" panose="02020603050405020304" pitchFamily="18" charset="0"/>
-              </a:rPr>
-              <a:t> </a:t>
-            </a:r>
-            <a:r>
-              <a:rPr lang="es-ES_tradnl" sz="2800" i="1" dirty="0" err="1">
-                <a:latin typeface="+mn-lt"/>
-                <a:ea typeface="Times New Roman" panose="02020603050405020304" pitchFamily="18" charset="0"/>
-              </a:rPr>
-              <a:t>int</a:t>
-            </a:r>
-            <a:r>
-              <a:rPr lang="es-ES_tradnl" sz="2800" i="1" dirty="0">
-                <a:latin typeface="+mn-lt"/>
-                <a:ea typeface="Times New Roman" panose="02020603050405020304" pitchFamily="18" charset="0"/>
-              </a:rPr>
-              <a:t>[10</a:t>
-            </a:r>
-            <a:r>
-              <a:rPr lang="es-ES_tradnl" sz="2800" i="1" dirty="0" smtClean="0">
-                <a:latin typeface="+mn-lt"/>
-                <a:ea typeface="Times New Roman" panose="02020603050405020304" pitchFamily="18" charset="0"/>
-              </a:rPr>
-              <a:t>];</a:t>
-            </a:r>
-          </a:p>
-          <a:p>
-            <a:pPr marL="457200" algn="just">
+              <a:rPr lang="es-ES_tradnl" sz="2800" dirty="0">
+                <a:latin typeface="+mn-lt"/>
+                <a:ea typeface="Times New Roman" panose="02020603050405020304" pitchFamily="18" charset="0"/>
+              </a:rPr>
+              <a:t> (como para el resto de los objetos</a:t>
+            </a:r>
+            <a:r>
+              <a:rPr lang="es-ES_tradnl" sz="2800" dirty="0" smtClean="0">
+                <a:latin typeface="+mn-lt"/>
+                <a:ea typeface="Times New Roman" panose="02020603050405020304" pitchFamily="18" charset="0"/>
+              </a:rPr>
+              <a:t>).</a:t>
+            </a:r>
+          </a:p>
+          <a:p>
+            <a:pPr algn="just">
               <a:spcBef>
                 <a:spcPts val="600"/>
               </a:spcBef>
@@ -18274,7 +18691,7 @@
                 <a:spcPts val="0"/>
               </a:spcAft>
             </a:pPr>
-            <a:endParaRPr lang="es-MX" sz="2800" i="1" dirty="0">
+            <a:endParaRPr lang="es-MX" sz="2800" dirty="0">
               <a:latin typeface="+mn-lt"/>
               <a:ea typeface="Times New Roman" panose="02020603050405020304" pitchFamily="18" charset="0"/>
             </a:endParaRPr>
@@ -18293,28 +18710,87 @@
                 <a:latin typeface="+mn-lt"/>
                 <a:ea typeface="Times New Roman" panose="02020603050405020304" pitchFamily="18" charset="0"/>
               </a:rPr>
-              <a:t>Indica que para el arreglo </a:t>
+              <a:t>&lt;nombre&gt; = </a:t>
             </a:r>
             <a:r>
               <a:rPr lang="es-ES_tradnl" sz="2800" b="1" dirty="0">
                 <a:latin typeface="+mn-lt"/>
                 <a:ea typeface="Times New Roman" panose="02020603050405020304" pitchFamily="18" charset="0"/>
               </a:rPr>
-              <a:t>notas</a:t>
+              <a:t>new</a:t>
             </a:r>
             <a:r>
               <a:rPr lang="es-ES_tradnl" sz="2800" dirty="0">
                 <a:latin typeface="+mn-lt"/>
                 <a:ea typeface="Times New Roman" panose="02020603050405020304" pitchFamily="18" charset="0"/>
               </a:rPr>
-              <a:t> se reservarán 10 posiciones y en cada una de ellas habrá un valor entero. O sea en este momento se crea el </a:t>
+              <a:t> &lt;tipo&gt; </a:t>
+            </a:r>
+            <a:r>
+              <a:rPr lang="es-ES_tradnl" sz="2800" b="1" dirty="0">
+                <a:latin typeface="+mn-lt"/>
+                <a:ea typeface="Times New Roman" panose="02020603050405020304" pitchFamily="18" charset="0"/>
+              </a:rPr>
+              <a:t>[</a:t>
+            </a:r>
+            <a:r>
+              <a:rPr lang="es-ES_tradnl" sz="2800" dirty="0">
+                <a:latin typeface="+mn-lt"/>
+                <a:ea typeface="Times New Roman" panose="02020603050405020304" pitchFamily="18" charset="0"/>
+              </a:rPr>
+              <a:t>&lt;valor</a:t>
             </a:r>
             <a:r>
               <a:rPr lang="es-ES_tradnl" sz="2800" dirty="0" smtClean="0">
                 <a:latin typeface="+mn-lt"/>
                 <a:ea typeface="Times New Roman" panose="02020603050405020304" pitchFamily="18" charset="0"/>
               </a:rPr>
-              <a:t>arreglo. </a:t>
+              <a:t>&gt;</a:t>
+            </a:r>
+            <a:r>
+              <a:rPr lang="es-ES_tradnl" sz="2800" b="1" dirty="0" smtClean="0">
+                <a:latin typeface="+mn-lt"/>
+                <a:ea typeface="Times New Roman" panose="02020603050405020304" pitchFamily="18" charset="0"/>
+              </a:rPr>
+              <a:t>]</a:t>
+            </a:r>
+            <a:r>
+              <a:rPr lang="es-ES_tradnl" sz="2800" dirty="0" smtClean="0">
+                <a:latin typeface="+mn-lt"/>
+                <a:ea typeface="Times New Roman" panose="02020603050405020304" pitchFamily="18" charset="0"/>
+              </a:rPr>
+              <a:t>;</a:t>
+            </a:r>
+          </a:p>
+          <a:p>
+            <a:pPr marL="457200" algn="just">
+              <a:spcBef>
+                <a:spcPts val="600"/>
+              </a:spcBef>
+              <a:spcAft>
+                <a:spcPts val="0"/>
+              </a:spcAft>
+            </a:pPr>
+            <a:endParaRPr lang="es-MX" sz="2800" dirty="0">
+              <a:latin typeface="+mn-lt"/>
+              <a:ea typeface="Times New Roman" panose="02020603050405020304" pitchFamily="18" charset="0"/>
+            </a:endParaRPr>
+          </a:p>
+          <a:p>
+            <a:pPr algn="just">
+              <a:spcBef>
+                <a:spcPts val="600"/>
+              </a:spcBef>
+              <a:spcAft>
+                <a:spcPts val="0"/>
+              </a:spcAft>
+            </a:pPr>
+            <a:r>
+              <a:rPr lang="es-ES_tradnl" sz="2800" dirty="0">
+                <a:latin typeface="+mn-lt"/>
+                <a:ea typeface="Times New Roman" panose="02020603050405020304" pitchFamily="18" charset="0"/>
+              </a:rPr>
+              <a:t>El nombre y el tipo coinciden con los declarados. El valor es la cantidad de elementos que tendrá el arreglo (su longitud).</a:t>
             </a:r>
             <a:endParaRPr lang="es-MX" sz="2800" dirty="0">
               <a:effectLst/>
@@ -18324,152 +18800,10 @@
           </a:p>
         </p:txBody>
       </p:sp>
-      <p:sp>
-        <p:nvSpPr>
-          <p:cNvPr id="9" name="Rectángulo 8"/>
-          <p:cNvSpPr/>
-          <p:nvPr/>
-        </p:nvSpPr>
-        <p:spPr>
-          <a:xfrm>
-            <a:off x="467591" y="3999445"/>
-            <a:ext cx="8219209" cy="2477601"/>
-          </a:xfrm>
-          <a:prstGeom prst="rect">
-            <a:avLst/>
-          </a:prstGeom>
-        </p:spPr>
-        <p:txBody>
-          <a:bodyPr wrap="square">
-            <a:spAutoFit/>
-          </a:bodyPr>
-          <a:lstStyle/>
-          <a:p>
-            <a:pPr algn="just">
-              <a:spcBef>
-                <a:spcPts val="600"/>
-              </a:spcBef>
-              <a:spcAft>
-                <a:spcPts val="0"/>
-              </a:spcAft>
-            </a:pPr>
-            <a:r>
-              <a:rPr lang="es-ES_tradnl" sz="2800" dirty="0">
-                <a:latin typeface="+mn-lt"/>
-                <a:ea typeface="Times New Roman" panose="02020603050405020304" pitchFamily="18" charset="0"/>
-              </a:rPr>
-              <a:t>La declaración y la creación de un objeto se pueden hacer en la misma instrucción:</a:t>
-            </a:r>
-            <a:endParaRPr lang="es-MX" sz="2800" dirty="0">
-              <a:latin typeface="+mn-lt"/>
-              <a:ea typeface="Times New Roman" panose="02020603050405020304" pitchFamily="18" charset="0"/>
-            </a:endParaRPr>
-          </a:p>
-          <a:p>
-            <a:pPr marL="457200" algn="just">
-              <a:spcBef>
-                <a:spcPts val="600"/>
-              </a:spcBef>
-              <a:spcAft>
-                <a:spcPts val="0"/>
-              </a:spcAft>
-            </a:pPr>
-            <a:r>
-              <a:rPr lang="es-ES_tradnl" sz="2800" dirty="0">
-                <a:latin typeface="+mn-lt"/>
-                <a:ea typeface="Times New Roman" panose="02020603050405020304" pitchFamily="18" charset="0"/>
-              </a:rPr>
-              <a:t>&lt;tipo&gt;[] &lt;nombre&gt; = new &lt;tipo&gt; [&lt;valor&gt;];</a:t>
-            </a:r>
-            <a:endParaRPr lang="es-MX" sz="2800" dirty="0">
-              <a:latin typeface="+mn-lt"/>
-              <a:ea typeface="Times New Roman" panose="02020603050405020304" pitchFamily="18" charset="0"/>
-            </a:endParaRPr>
-          </a:p>
-          <a:p>
-            <a:pPr algn="just">
-              <a:spcBef>
-                <a:spcPts val="600"/>
-              </a:spcBef>
-              <a:spcAft>
-                <a:spcPts val="0"/>
-              </a:spcAft>
-            </a:pPr>
-            <a:r>
-              <a:rPr lang="es-ES_tradnl" sz="2800" dirty="0">
-                <a:latin typeface="+mn-lt"/>
-                <a:ea typeface="Times New Roman" panose="02020603050405020304" pitchFamily="18" charset="0"/>
-              </a:rPr>
-              <a:t>Ejemplo</a:t>
-            </a:r>
-            <a:endParaRPr lang="es-MX" sz="2800" dirty="0">
-              <a:latin typeface="+mn-lt"/>
-              <a:ea typeface="Times New Roman" panose="02020603050405020304" pitchFamily="18" charset="0"/>
-            </a:endParaRPr>
-          </a:p>
-          <a:p>
-            <a:pPr marL="457200" algn="just">
-              <a:spcBef>
-                <a:spcPts val="600"/>
-              </a:spcBef>
-              <a:spcAft>
-                <a:spcPts val="0"/>
-              </a:spcAft>
-            </a:pPr>
-            <a:r>
-              <a:rPr lang="es-ES_tradnl" sz="2800" dirty="0" err="1">
-                <a:latin typeface="+mn-lt"/>
-                <a:ea typeface="Times New Roman" panose="02020603050405020304" pitchFamily="18" charset="0"/>
-              </a:rPr>
-              <a:t>int</a:t>
-            </a:r>
-            <a:r>
-              <a:rPr lang="es-ES_tradnl" sz="2800" dirty="0">
-                <a:latin typeface="+mn-lt"/>
-                <a:ea typeface="Times New Roman" panose="02020603050405020304" pitchFamily="18" charset="0"/>
-              </a:rPr>
-              <a:t>[] notas= </a:t>
-            </a:r>
-            <a:r>
-              <a:rPr lang="es-ES_tradnl" sz="2800" b="1" dirty="0">
-                <a:latin typeface="+mn-lt"/>
-                <a:ea typeface="Times New Roman" panose="02020603050405020304" pitchFamily="18" charset="0"/>
-              </a:rPr>
-              <a:t>new</a:t>
-            </a:r>
-            <a:r>
-              <a:rPr lang="es-ES_tradnl" sz="2800" dirty="0">
-                <a:latin typeface="+mn-lt"/>
-                <a:ea typeface="Times New Roman" panose="02020603050405020304" pitchFamily="18" charset="0"/>
-              </a:rPr>
-              <a:t> </a:t>
-            </a:r>
-            <a:r>
-              <a:rPr lang="es-ES_tradnl" sz="2800" dirty="0" err="1">
-                <a:latin typeface="+mn-lt"/>
-                <a:ea typeface="Times New Roman" panose="02020603050405020304" pitchFamily="18" charset="0"/>
-              </a:rPr>
-              <a:t>int</a:t>
-            </a:r>
-            <a:r>
-              <a:rPr lang="es-ES_tradnl" sz="2800" dirty="0">
-                <a:latin typeface="+mn-lt"/>
-                <a:ea typeface="Times New Roman" panose="02020603050405020304" pitchFamily="18" charset="0"/>
-              </a:rPr>
-              <a:t>[10];</a:t>
-            </a:r>
-            <a:endParaRPr lang="es-MX" sz="2800" dirty="0">
-              <a:effectLst/>
-              <a:latin typeface="+mn-lt"/>
-              <a:ea typeface="Times New Roman" panose="02020603050405020304" pitchFamily="18" charset="0"/>
-            </a:endParaRPr>
-          </a:p>
-        </p:txBody>
-      </p:sp>
     </p:spTree>
     <p:extLst>
       <p:ext uri="{BB962C8B-B14F-4D97-AF65-F5344CB8AC3E}">
-        <p14:creationId xmlns:p14="http://schemas.microsoft.com/office/powerpoint/2010/main" val="3841350425"/>
+        <p14:creationId xmlns:p14="http://schemas.microsoft.com/office/powerpoint/2010/main" val="1023925797"/>
       </p:ext>
     </p:extLst>
   </p:cSld>
@@ -18477,13 +18811,6 @@
     <a:masterClrMapping/>
   </p:clrMapOvr>
   <p:transition spd="med"/>
-  <p:timing>
-    <p:tnLst>
-      <p:par>
-        <p:cTn id="1" dur="indefinite" restart="never" nodeType="tmRoot"/>
-      </p:par>
-    </p:tnLst>
-  </p:timing>
 </p:sld>
 </file>
 
@@ -18523,6 +18850,975 @@
               <a:rPr lang="en-US" altLang="es-MX" smtClean="0"/>
               <a:pPr/>
               <a:t>29</a:t>
+            </a:fld>
+            <a:endParaRPr lang="en-US" altLang="es-MX"/>
+          </a:p>
+        </p:txBody>
+      </p:sp>
+      <p:sp>
+        <p:nvSpPr>
+          <p:cNvPr id="6" name="Título 1"/>
+          <p:cNvSpPr txBox="1">
+            <a:spLocks/>
+          </p:cNvSpPr>
+          <p:nvPr/>
+        </p:nvSpPr>
+        <p:spPr bwMode="auto">
+          <a:xfrm>
+            <a:off x="467591" y="63572"/>
+            <a:ext cx="8229600" cy="1371600"/>
+          </a:xfrm>
+          <a:prstGeom prst="rect">
+            <a:avLst/>
+          </a:prstGeom>
+          <a:noFill/>
+          <a:ln>
+            <a:noFill/>
+          </a:ln>
+          <a:extLst>
+            <a:ext uri="{909E8E84-426E-40DD-AFC4-6F175D3DCCD1}">
+              <a14:hiddenFill xmlns:a14="http://schemas.microsoft.com/office/drawing/2010/main">
+                <a:solidFill>
+                  <a:srgbClr val="FFFFFF"/>
+                </a:solidFill>
+              </a14:hiddenFill>
+            </a:ext>
+            <a:ext uri="{91240B29-F687-4F45-9708-019B960494DF}">
+              <a14:hiddenLine xmlns:a14="http://schemas.microsoft.com/office/drawing/2010/main" w="9525">
+                <a:solidFill>
+                  <a:srgbClr val="000000"/>
+                </a:solidFill>
+                <a:miter lim="800000"/>
+                <a:headEnd/>
+                <a:tailEnd/>
+              </a14:hiddenLine>
+            </a:ext>
+          </a:extLst>
+        </p:spPr>
+        <p:txBody>
+          <a:bodyPr vert="horz" wrap="square" lIns="91440" tIns="45720" rIns="91440" bIns="45720" numCol="1" anchor="ctr" anchorCtr="0" compatLnSpc="1">
+            <a:prstTxWarp prst="textNoShape">
+              <a:avLst/>
+            </a:prstTxWarp>
+          </a:bodyPr>
+          <a:lstStyle>
+            <a:lvl1pPr algn="l" rtl="0" eaLnBrk="0" fontAlgn="base" hangingPunct="0">
+              <a:spcBef>
+                <a:spcPct val="0"/>
+              </a:spcBef>
+              <a:spcAft>
+                <a:spcPct val="0"/>
+              </a:spcAft>
+              <a:defRPr sz="4400">
+                <a:solidFill>
+                  <a:schemeClr val="tx1"/>
+                </a:solidFill>
+                <a:latin typeface="+mj-lt"/>
+                <a:ea typeface="+mj-ea"/>
+                <a:cs typeface="+mj-cs"/>
+              </a:defRPr>
+            </a:lvl1pPr>
+            <a:lvl2pPr algn="l" rtl="0" eaLnBrk="0" fontAlgn="base" hangingPunct="0">
+              <a:spcBef>
+                <a:spcPct val="0"/>
+              </a:spcBef>
+              <a:spcAft>
+                <a:spcPct val="0"/>
+              </a:spcAft>
+              <a:defRPr sz="4400">
+                <a:solidFill>
+                  <a:schemeClr val="tx1"/>
+                </a:solidFill>
+                <a:latin typeface="Arial" pitchFamily="34" charset="0"/>
+              </a:defRPr>
+            </a:lvl2pPr>
+            <a:lvl3pPr algn="l" rtl="0" eaLnBrk="0" fontAlgn="base" hangingPunct="0">
+              <a:spcBef>
+                <a:spcPct val="0"/>
+              </a:spcBef>
+              <a:spcAft>
+                <a:spcPct val="0"/>
+              </a:spcAft>
+              <a:defRPr sz="4400">
+                <a:solidFill>
+                  <a:schemeClr val="tx1"/>
+                </a:solidFill>
+                <a:latin typeface="Arial" pitchFamily="34" charset="0"/>
+              </a:defRPr>
+            </a:lvl3pPr>
+            <a:lvl4pPr algn="l" rtl="0" eaLnBrk="0" fontAlgn="base" hangingPunct="0">
+              <a:spcBef>
+                <a:spcPct val="0"/>
+              </a:spcBef>
+              <a:spcAft>
+                <a:spcPct val="0"/>
+              </a:spcAft>
+              <a:defRPr sz="4400">
+                <a:solidFill>
+                  <a:schemeClr val="tx1"/>
+                </a:solidFill>
+                <a:latin typeface="Arial" pitchFamily="34" charset="0"/>
+              </a:defRPr>
+            </a:lvl4pPr>
+            <a:lvl5pPr algn="l" rtl="0" eaLnBrk="0" fontAlgn="base" hangingPunct="0">
+              <a:spcBef>
+                <a:spcPct val="0"/>
+              </a:spcBef>
+              <a:spcAft>
+                <a:spcPct val="0"/>
+              </a:spcAft>
+              <a:defRPr sz="4400">
+                <a:solidFill>
+                  <a:schemeClr val="tx1"/>
+                </a:solidFill>
+                <a:latin typeface="Arial" pitchFamily="34" charset="0"/>
+              </a:defRPr>
+            </a:lvl5pPr>
+            <a:lvl6pPr marL="457200" algn="l" rtl="0" fontAlgn="base">
+              <a:spcBef>
+                <a:spcPct val="0"/>
+              </a:spcBef>
+              <a:spcAft>
+                <a:spcPct val="0"/>
+              </a:spcAft>
+              <a:defRPr sz="4400">
+                <a:solidFill>
+                  <a:schemeClr val="tx1"/>
+                </a:solidFill>
+                <a:latin typeface="Arial" pitchFamily="34" charset="0"/>
+              </a:defRPr>
+            </a:lvl6pPr>
+            <a:lvl7pPr marL="914400" algn="l" rtl="0" fontAlgn="base">
+              <a:spcBef>
+                <a:spcPct val="0"/>
+              </a:spcBef>
+              <a:spcAft>
+                <a:spcPct val="0"/>
+              </a:spcAft>
+              <a:defRPr sz="4400">
+                <a:solidFill>
+                  <a:schemeClr val="tx1"/>
+                </a:solidFill>
+                <a:latin typeface="Arial" pitchFamily="34" charset="0"/>
+              </a:defRPr>
+            </a:lvl7pPr>
+            <a:lvl8pPr marL="1371600" algn="l" rtl="0" fontAlgn="base">
+              <a:spcBef>
+                <a:spcPct val="0"/>
+              </a:spcBef>
+              <a:spcAft>
+                <a:spcPct val="0"/>
+              </a:spcAft>
+              <a:defRPr sz="4400">
+                <a:solidFill>
+                  <a:schemeClr val="tx1"/>
+                </a:solidFill>
+                <a:latin typeface="Arial" pitchFamily="34" charset="0"/>
+              </a:defRPr>
+            </a:lvl8pPr>
+            <a:lvl9pPr marL="1828800" algn="l" rtl="0" fontAlgn="base">
+              <a:spcBef>
+                <a:spcPct val="0"/>
+              </a:spcBef>
+              <a:spcAft>
+                <a:spcPct val="0"/>
+              </a:spcAft>
+              <a:defRPr sz="4400">
+                <a:solidFill>
+                  <a:schemeClr val="tx1"/>
+                </a:solidFill>
+                <a:latin typeface="Arial" pitchFamily="34" charset="0"/>
+              </a:defRPr>
+            </a:lvl9pPr>
+          </a:lstStyle>
+          <a:p>
+            <a:pPr eaLnBrk="1" hangingPunct="1"/>
+            <a:r>
+              <a:rPr lang="es-ES_tradnl" altLang="es-MX" b="1" dirty="0"/>
+              <a:t>4</a:t>
+            </a:r>
+            <a:r>
+              <a:rPr lang="es-ES_tradnl" altLang="es-MX" b="1" dirty="0" smtClean="0"/>
+              <a:t>.4 Clases útiles de Java</a:t>
+            </a:r>
+            <a:endParaRPr lang="es-ES_tradnl" altLang="es-MX" b="1" dirty="0"/>
+          </a:p>
+        </p:txBody>
+      </p:sp>
+      <p:sp>
+        <p:nvSpPr>
+          <p:cNvPr id="7" name="Rectángulo 6"/>
+          <p:cNvSpPr/>
+          <p:nvPr/>
+        </p:nvSpPr>
+        <p:spPr>
+          <a:xfrm>
+            <a:off x="0" y="1055315"/>
+            <a:ext cx="4953000" cy="461665"/>
+          </a:xfrm>
+          <a:prstGeom prst="rect">
+            <a:avLst/>
+          </a:prstGeom>
+        </p:spPr>
+        <p:txBody>
+          <a:bodyPr wrap="square">
+            <a:spAutoFit/>
+          </a:bodyPr>
+          <a:lstStyle/>
+          <a:p>
+            <a:pPr lvl="1" eaLnBrk="1" hangingPunct="1"/>
+            <a:r>
+              <a:rPr lang="es-ES_tradnl" altLang="es-MX" sz="2400" b="1" dirty="0" smtClean="0"/>
+              <a:t>Ejemplo:</a:t>
+            </a:r>
+            <a:endParaRPr lang="es-ES_tradnl" altLang="es-MX" sz="2400" b="1" dirty="0"/>
+          </a:p>
+        </p:txBody>
+      </p:sp>
+      <p:sp>
+        <p:nvSpPr>
+          <p:cNvPr id="8" name="Rectángulo 7"/>
+          <p:cNvSpPr/>
+          <p:nvPr/>
+        </p:nvSpPr>
+        <p:spPr>
+          <a:xfrm>
+            <a:off x="0" y="1516980"/>
+            <a:ext cx="8686800" cy="2400657"/>
+          </a:xfrm>
+          <a:prstGeom prst="rect">
+            <a:avLst/>
+          </a:prstGeom>
+        </p:spPr>
+        <p:txBody>
+          <a:bodyPr wrap="square">
+            <a:spAutoFit/>
+          </a:bodyPr>
+          <a:lstStyle/>
+          <a:p>
+            <a:pPr marL="457200" algn="just">
+              <a:spcBef>
+                <a:spcPts val="600"/>
+              </a:spcBef>
+              <a:spcAft>
+                <a:spcPts val="0"/>
+              </a:spcAft>
+            </a:pPr>
+            <a:r>
+              <a:rPr lang="es-ES_tradnl" sz="2800" i="1" dirty="0">
+                <a:latin typeface="+mn-lt"/>
+                <a:ea typeface="Times New Roman" panose="02020603050405020304" pitchFamily="18" charset="0"/>
+              </a:rPr>
+              <a:t>notas = </a:t>
+            </a:r>
+            <a:r>
+              <a:rPr lang="es-ES_tradnl" sz="2800" b="1" i="1" dirty="0">
+                <a:latin typeface="+mn-lt"/>
+                <a:ea typeface="Times New Roman" panose="02020603050405020304" pitchFamily="18" charset="0"/>
+              </a:rPr>
+              <a:t>new</a:t>
+            </a:r>
+            <a:r>
+              <a:rPr lang="es-ES_tradnl" sz="2800" i="1" dirty="0">
+                <a:latin typeface="+mn-lt"/>
+                <a:ea typeface="Times New Roman" panose="02020603050405020304" pitchFamily="18" charset="0"/>
+              </a:rPr>
+              <a:t> </a:t>
+            </a:r>
+            <a:r>
+              <a:rPr lang="es-ES_tradnl" sz="2800" i="1" dirty="0" err="1">
+                <a:latin typeface="+mn-lt"/>
+                <a:ea typeface="Times New Roman" panose="02020603050405020304" pitchFamily="18" charset="0"/>
+              </a:rPr>
+              <a:t>int</a:t>
+            </a:r>
+            <a:r>
+              <a:rPr lang="es-ES_tradnl" sz="2800" i="1" dirty="0">
+                <a:latin typeface="+mn-lt"/>
+                <a:ea typeface="Times New Roman" panose="02020603050405020304" pitchFamily="18" charset="0"/>
+              </a:rPr>
+              <a:t>[10</a:t>
+            </a:r>
+            <a:r>
+              <a:rPr lang="es-ES_tradnl" sz="2800" i="1" dirty="0" smtClean="0">
+                <a:latin typeface="+mn-lt"/>
+                <a:ea typeface="Times New Roman" panose="02020603050405020304" pitchFamily="18" charset="0"/>
+              </a:rPr>
+              <a:t>];</a:t>
+            </a:r>
+          </a:p>
+          <a:p>
+            <a:pPr marL="457200" algn="just">
+              <a:spcBef>
+                <a:spcPts val="600"/>
+              </a:spcBef>
+              <a:spcAft>
+                <a:spcPts val="0"/>
+              </a:spcAft>
+            </a:pPr>
+            <a:endParaRPr lang="es-MX" sz="2800" i="1" dirty="0">
+              <a:latin typeface="+mn-lt"/>
+              <a:ea typeface="Times New Roman" panose="02020603050405020304" pitchFamily="18" charset="0"/>
+            </a:endParaRPr>
+          </a:p>
+          <a:p>
+            <a:pPr marL="457200" algn="just">
+              <a:spcBef>
+                <a:spcPts val="600"/>
+              </a:spcBef>
+              <a:spcAft>
+                <a:spcPts val="0"/>
+              </a:spcAft>
+            </a:pPr>
+            <a:r>
+              <a:rPr lang="es-ES_tradnl" sz="2800" dirty="0">
+                <a:latin typeface="+mn-lt"/>
+                <a:ea typeface="Times New Roman" panose="02020603050405020304" pitchFamily="18" charset="0"/>
+              </a:rPr>
+              <a:t>Indica que para el arreglo </a:t>
+            </a:r>
+            <a:r>
+              <a:rPr lang="es-ES_tradnl" sz="2800" b="1" dirty="0">
+                <a:latin typeface="+mn-lt"/>
+                <a:ea typeface="Times New Roman" panose="02020603050405020304" pitchFamily="18" charset="0"/>
+              </a:rPr>
+              <a:t>notas</a:t>
+            </a:r>
+            <a:r>
+              <a:rPr lang="es-ES_tradnl" sz="2800" dirty="0">
+                <a:latin typeface="+mn-lt"/>
+                <a:ea typeface="Times New Roman" panose="02020603050405020304" pitchFamily="18" charset="0"/>
+              </a:rPr>
+              <a:t> se reservarán 10 posiciones y en cada una de ellas habrá un valor entero. O sea en este momento se crea el </a:t>
+            </a:r>
+            <a:r>
+              <a:rPr lang="es-ES_tradnl" sz="2800" dirty="0" smtClean="0">
+                <a:latin typeface="+mn-lt"/>
+                <a:ea typeface="Times New Roman" panose="02020603050405020304" pitchFamily="18" charset="0"/>
+              </a:rPr>
+              <a:t>arreglo. </a:t>
+            </a:r>
+            <a:endParaRPr lang="es-MX" sz="2800" dirty="0">
+              <a:effectLst/>
+              <a:latin typeface="+mn-lt"/>
+              <a:ea typeface="Times New Roman" panose="02020603050405020304" pitchFamily="18" charset="0"/>
+            </a:endParaRPr>
+          </a:p>
+        </p:txBody>
+      </p:sp>
+      <p:sp>
+        <p:nvSpPr>
+          <p:cNvPr id="9" name="Rectángulo 8"/>
+          <p:cNvSpPr/>
+          <p:nvPr/>
+        </p:nvSpPr>
+        <p:spPr>
+          <a:xfrm>
+            <a:off x="467591" y="3999445"/>
+            <a:ext cx="8219209" cy="2477601"/>
+          </a:xfrm>
+          <a:prstGeom prst="rect">
+            <a:avLst/>
+          </a:prstGeom>
+        </p:spPr>
+        <p:txBody>
+          <a:bodyPr wrap="square">
+            <a:spAutoFit/>
+          </a:bodyPr>
+          <a:lstStyle/>
+          <a:p>
+            <a:pPr algn="just">
+              <a:spcBef>
+                <a:spcPts val="600"/>
+              </a:spcBef>
+              <a:spcAft>
+                <a:spcPts val="0"/>
+              </a:spcAft>
+            </a:pPr>
+            <a:r>
+              <a:rPr lang="es-ES_tradnl" sz="2800" dirty="0">
+                <a:latin typeface="+mn-lt"/>
+                <a:ea typeface="Times New Roman" panose="02020603050405020304" pitchFamily="18" charset="0"/>
+              </a:rPr>
+              <a:t>La declaración y la creación de un objeto se pueden hacer en la misma instrucción:</a:t>
+            </a:r>
+            <a:endParaRPr lang="es-MX" sz="2800" dirty="0">
+              <a:latin typeface="+mn-lt"/>
+              <a:ea typeface="Times New Roman" panose="02020603050405020304" pitchFamily="18" charset="0"/>
+            </a:endParaRPr>
+          </a:p>
+          <a:p>
+            <a:pPr marL="457200" algn="just">
+              <a:spcBef>
+                <a:spcPts val="600"/>
+              </a:spcBef>
+              <a:spcAft>
+                <a:spcPts val="0"/>
+              </a:spcAft>
+            </a:pPr>
+            <a:r>
+              <a:rPr lang="es-ES_tradnl" sz="2800" dirty="0">
+                <a:latin typeface="+mn-lt"/>
+                <a:ea typeface="Times New Roman" panose="02020603050405020304" pitchFamily="18" charset="0"/>
+              </a:rPr>
+              <a:t>&lt;tipo&gt;[] &lt;nombre&gt; = new &lt;tipo&gt; [&lt;valor&gt;];</a:t>
+            </a:r>
+            <a:endParaRPr lang="es-MX" sz="2800" dirty="0">
+              <a:latin typeface="+mn-lt"/>
+              <a:ea typeface="Times New Roman" panose="02020603050405020304" pitchFamily="18" charset="0"/>
+            </a:endParaRPr>
+          </a:p>
+          <a:p>
+            <a:pPr algn="just">
+              <a:spcBef>
+                <a:spcPts val="600"/>
+              </a:spcBef>
+              <a:spcAft>
+                <a:spcPts val="0"/>
+              </a:spcAft>
+            </a:pPr>
+            <a:r>
+              <a:rPr lang="es-ES_tradnl" sz="2800" dirty="0">
+                <a:latin typeface="+mn-lt"/>
+                <a:ea typeface="Times New Roman" panose="02020603050405020304" pitchFamily="18" charset="0"/>
+              </a:rPr>
+              <a:t>Ejemplo</a:t>
+            </a:r>
+            <a:endParaRPr lang="es-MX" sz="2800" dirty="0">
+              <a:latin typeface="+mn-lt"/>
+              <a:ea typeface="Times New Roman" panose="02020603050405020304" pitchFamily="18" charset="0"/>
+            </a:endParaRPr>
+          </a:p>
+          <a:p>
+            <a:pPr marL="457200" algn="just">
+              <a:spcBef>
+                <a:spcPts val="600"/>
+              </a:spcBef>
+              <a:spcAft>
+                <a:spcPts val="0"/>
+              </a:spcAft>
+            </a:pPr>
+            <a:r>
+              <a:rPr lang="es-ES_tradnl" sz="2800" dirty="0" err="1">
+                <a:latin typeface="+mn-lt"/>
+                <a:ea typeface="Times New Roman" panose="02020603050405020304" pitchFamily="18" charset="0"/>
+              </a:rPr>
+              <a:t>int</a:t>
+            </a:r>
+            <a:r>
+              <a:rPr lang="es-ES_tradnl" sz="2800" dirty="0">
+                <a:latin typeface="+mn-lt"/>
+                <a:ea typeface="Times New Roman" panose="02020603050405020304" pitchFamily="18" charset="0"/>
+              </a:rPr>
+              <a:t>[] notas= </a:t>
+            </a:r>
+            <a:r>
+              <a:rPr lang="es-ES_tradnl" sz="2800" b="1" dirty="0">
+                <a:latin typeface="+mn-lt"/>
+                <a:ea typeface="Times New Roman" panose="02020603050405020304" pitchFamily="18" charset="0"/>
+              </a:rPr>
+              <a:t>new</a:t>
+            </a:r>
+            <a:r>
+              <a:rPr lang="es-ES_tradnl" sz="2800" dirty="0">
+                <a:latin typeface="+mn-lt"/>
+                <a:ea typeface="Times New Roman" panose="02020603050405020304" pitchFamily="18" charset="0"/>
+              </a:rPr>
+              <a:t> </a:t>
+            </a:r>
+            <a:r>
+              <a:rPr lang="es-ES_tradnl" sz="2800" dirty="0" err="1">
+                <a:latin typeface="+mn-lt"/>
+                <a:ea typeface="Times New Roman" panose="02020603050405020304" pitchFamily="18" charset="0"/>
+              </a:rPr>
+              <a:t>int</a:t>
+            </a:r>
+            <a:r>
+              <a:rPr lang="es-ES_tradnl" sz="2800" dirty="0">
+                <a:latin typeface="+mn-lt"/>
+                <a:ea typeface="Times New Roman" panose="02020603050405020304" pitchFamily="18" charset="0"/>
+              </a:rPr>
+              <a:t>[10];</a:t>
+            </a:r>
+            <a:endParaRPr lang="es-MX" sz="2800" dirty="0">
+              <a:effectLst/>
+              <a:latin typeface="+mn-lt"/>
+              <a:ea typeface="Times New Roman" panose="02020603050405020304" pitchFamily="18" charset="0"/>
+            </a:endParaRPr>
+          </a:p>
+        </p:txBody>
+      </p:sp>
+    </p:spTree>
+    <p:extLst>
+      <p:ext uri="{BB962C8B-B14F-4D97-AF65-F5344CB8AC3E}">
+        <p14:creationId xmlns:p14="http://schemas.microsoft.com/office/powerpoint/2010/main" val="3841350425"/>
+      </p:ext>
+    </p:extLst>
+  </p:cSld>
+  <p:clrMapOvr>
+    <a:masterClrMapping/>
+  </p:clrMapOvr>
+  <p:transition spd="med"/>
+  <p:timing>
+    <p:tnLst>
+      <p:par>
+        <p:cTn id="1" dur="indefinite" restart="never" nodeType="tmRoot"/>
+      </p:par>
+    </p:tnLst>
+  </p:timing>
+</p:sld>
+</file>
+
+<file path=ppt/slides/slide3.xml><?xml version="1.0" encoding="utf-8"?>
+<p:sld xmlns:a="http://schemas.openxmlformats.org/drawingml/2006/main" xmlns:r="http://schemas.openxmlformats.org/officeDocument/2006/relationships" xmlns:p="http://schemas.openxmlformats.org/presentationml/2006/main">
+  <p:cSld>
+    <p:spTree>
+      <p:nvGrpSpPr>
+        <p:cNvPr id="1" name=""/>
+        <p:cNvGrpSpPr/>
+        <p:nvPr/>
+      </p:nvGrpSpPr>
+      <p:grpSpPr>
+        <a:xfrm>
+          <a:off x="0" y="0"/>
+          <a:ext cx="0" cy="0"/>
+          <a:chOff x="0" y="0"/>
+          <a:chExt cx="0" cy="0"/>
+        </a:xfrm>
+      </p:grpSpPr>
+      <p:sp>
+        <p:nvSpPr>
+          <p:cNvPr id="6146" name="Slide Number Placeholder 3"/>
+          <p:cNvSpPr>
+            <a:spLocks noGrp="1"/>
+          </p:cNvSpPr>
+          <p:nvPr>
+            <p:ph type="sldNum" sz="quarter" idx="11"/>
+          </p:nvPr>
+        </p:nvSpPr>
+        <p:spPr>
+          <a:noFill/>
+          <a:ln/>
+          <a:extLst>
+            <a:ext uri="{909E8E84-426E-40DD-AFC4-6F175D3DCCD1}">
+              <a14:hiddenFill xmlns:a14="http://schemas.microsoft.com/office/drawing/2010/main">
+                <a:solidFill>
+                  <a:srgbClr val="FFFFFF"/>
+                </a:solidFill>
+              </a14:hiddenFill>
+            </a:ext>
+            <a:ext uri="{91240B29-F687-4F45-9708-019B960494DF}">
+              <a14:hiddenLine xmlns:a14="http://schemas.microsoft.com/office/drawing/2010/main" w="9525">
+                <a:solidFill>
+                  <a:srgbClr val="000000"/>
+                </a:solidFill>
+                <a:miter lim="800000"/>
+                <a:headEnd/>
+                <a:tailEnd/>
+              </a14:hiddenLine>
+            </a:ext>
+          </a:extLst>
+        </p:spPr>
+        <p:txBody>
+          <a:bodyPr/>
+          <a:lstStyle>
+            <a:lvl1pPr>
+              <a:defRPr>
+                <a:solidFill>
+                  <a:schemeClr val="tx1"/>
+                </a:solidFill>
+                <a:latin typeface="Arial" panose="020B0604020202020204" pitchFamily="34" charset="0"/>
+              </a:defRPr>
+            </a:lvl1pPr>
+            <a:lvl2pPr marL="742950" indent="-285750">
+              <a:defRPr>
+                <a:solidFill>
+                  <a:schemeClr val="tx1"/>
+                </a:solidFill>
+                <a:latin typeface="Arial" panose="020B0604020202020204" pitchFamily="34" charset="0"/>
+              </a:defRPr>
+            </a:lvl2pPr>
+            <a:lvl3pPr marL="1143000" indent="-228600">
+              <a:defRPr>
+                <a:solidFill>
+                  <a:schemeClr val="tx1"/>
+                </a:solidFill>
+                <a:latin typeface="Arial" panose="020B0604020202020204" pitchFamily="34" charset="0"/>
+              </a:defRPr>
+            </a:lvl3pPr>
+            <a:lvl4pPr marL="1600200" indent="-228600">
+              <a:defRPr>
+                <a:solidFill>
+                  <a:schemeClr val="tx1"/>
+                </a:solidFill>
+                <a:latin typeface="Arial" panose="020B0604020202020204" pitchFamily="34" charset="0"/>
+              </a:defRPr>
+            </a:lvl4pPr>
+            <a:lvl5pPr marL="2057400" indent="-228600">
+              <a:defRPr>
+                <a:solidFill>
+                  <a:schemeClr val="tx1"/>
+                </a:solidFill>
+                <a:latin typeface="Arial" panose="020B0604020202020204" pitchFamily="34" charset="0"/>
+              </a:defRPr>
+            </a:lvl5pPr>
+            <a:lvl6pPr marL="2514600" indent="-228600" eaLnBrk="0" fontAlgn="base" hangingPunct="0">
+              <a:spcBef>
+                <a:spcPct val="0"/>
+              </a:spcBef>
+              <a:spcAft>
+                <a:spcPct val="0"/>
+              </a:spcAft>
+              <a:defRPr>
+                <a:solidFill>
+                  <a:schemeClr val="tx1"/>
+                </a:solidFill>
+                <a:latin typeface="Arial" panose="020B0604020202020204" pitchFamily="34" charset="0"/>
+              </a:defRPr>
+            </a:lvl6pPr>
+            <a:lvl7pPr marL="2971800" indent="-228600" eaLnBrk="0" fontAlgn="base" hangingPunct="0">
+              <a:spcBef>
+                <a:spcPct val="0"/>
+              </a:spcBef>
+              <a:spcAft>
+                <a:spcPct val="0"/>
+              </a:spcAft>
+              <a:defRPr>
+                <a:solidFill>
+                  <a:schemeClr val="tx1"/>
+                </a:solidFill>
+                <a:latin typeface="Arial" panose="020B0604020202020204" pitchFamily="34" charset="0"/>
+              </a:defRPr>
+            </a:lvl7pPr>
+            <a:lvl8pPr marL="3429000" indent="-228600" eaLnBrk="0" fontAlgn="base" hangingPunct="0">
+              <a:spcBef>
+                <a:spcPct val="0"/>
+              </a:spcBef>
+              <a:spcAft>
+                <a:spcPct val="0"/>
+              </a:spcAft>
+              <a:defRPr>
+                <a:solidFill>
+                  <a:schemeClr val="tx1"/>
+                </a:solidFill>
+                <a:latin typeface="Arial" panose="020B0604020202020204" pitchFamily="34" charset="0"/>
+              </a:defRPr>
+            </a:lvl8pPr>
+            <a:lvl9pPr marL="3886200" indent="-228600" eaLnBrk="0" fontAlgn="base" hangingPunct="0">
+              <a:spcBef>
+                <a:spcPct val="0"/>
+              </a:spcBef>
+              <a:spcAft>
+                <a:spcPct val="0"/>
+              </a:spcAft>
+              <a:defRPr>
+                <a:solidFill>
+                  <a:schemeClr val="tx1"/>
+                </a:solidFill>
+                <a:latin typeface="Arial" panose="020B0604020202020204" pitchFamily="34" charset="0"/>
+              </a:defRPr>
+            </a:lvl9pPr>
+          </a:lstStyle>
+          <a:p>
+            <a:fld id="{7A9385D2-0AA6-4174-824D-EECB24A688AF}" type="slidenum">
+              <a:rPr lang="en-US" altLang="es-MX">
+                <a:latin typeface="Arial Black" panose="020B0A04020102020204" pitchFamily="34" charset="0"/>
+              </a:rPr>
+              <a:pPr/>
+              <a:t>3</a:t>
+            </a:fld>
+            <a:endParaRPr lang="en-US" altLang="es-MX">
+              <a:latin typeface="Arial Black" panose="020B0A04020102020204" pitchFamily="34" charset="0"/>
+            </a:endParaRPr>
+          </a:p>
+        </p:txBody>
+      </p:sp>
+      <p:sp>
+        <p:nvSpPr>
+          <p:cNvPr id="6147" name="Rectangle 4"/>
+          <p:cNvSpPr>
+            <a:spLocks noGrp="1" noChangeArrowheads="1"/>
+          </p:cNvSpPr>
+          <p:nvPr>
+            <p:ph type="title"/>
+          </p:nvPr>
+        </p:nvSpPr>
+        <p:spPr/>
+        <p:txBody>
+          <a:bodyPr/>
+          <a:lstStyle/>
+          <a:p>
+            <a:pPr eaLnBrk="1" hangingPunct="1"/>
+            <a:r>
+              <a:rPr lang="es-ES_tradnl" altLang="es-MX" sz="4000" b="1" dirty="0" smtClean="0"/>
+              <a:t>4.1 Concepto de clase</a:t>
+            </a:r>
+            <a:endParaRPr lang="en-US" altLang="es-MX" sz="4000" b="1" dirty="0" smtClean="0"/>
+          </a:p>
+        </p:txBody>
+      </p:sp>
+      <p:sp>
+        <p:nvSpPr>
+          <p:cNvPr id="6148" name="Rectangle 5"/>
+          <p:cNvSpPr>
+            <a:spLocks noChangeArrowheads="1"/>
+          </p:cNvSpPr>
+          <p:nvPr/>
+        </p:nvSpPr>
+        <p:spPr bwMode="auto">
+          <a:xfrm>
+            <a:off x="1430338" y="3181985"/>
+            <a:ext cx="65" cy="492443"/>
+          </a:xfrm>
+          <a:prstGeom prst="rect">
+            <a:avLst/>
+          </a:prstGeom>
+          <a:noFill/>
+          <a:ln>
+            <a:noFill/>
+          </a:ln>
+          <a:extLst>
+            <a:ext uri="{909E8E84-426E-40DD-AFC4-6F175D3DCCD1}">
+              <a14:hiddenFill xmlns:a14="http://schemas.microsoft.com/office/drawing/2010/main">
+                <a:solidFill>
+                  <a:srgbClr val="FFFFFF"/>
+                </a:solidFill>
+              </a14:hiddenFill>
+            </a:ext>
+            <a:ext uri="{91240B29-F687-4F45-9708-019B960494DF}">
+              <a14:hiddenLine xmlns:a14="http://schemas.microsoft.com/office/drawing/2010/main" w="9525">
+                <a:solidFill>
+                  <a:srgbClr val="000000"/>
+                </a:solidFill>
+                <a:miter lim="800000"/>
+                <a:headEnd/>
+                <a:tailEnd/>
+              </a14:hiddenLine>
+            </a:ext>
+          </a:extLst>
+        </p:spPr>
+        <p:txBody>
+          <a:bodyPr wrap="none" lIns="0" tIns="0" rIns="0" bIns="0" anchor="ctr">
+            <a:spAutoFit/>
+          </a:bodyPr>
+          <a:lstStyle>
+            <a:lvl1pPr>
+              <a:defRPr>
+                <a:solidFill>
+                  <a:schemeClr val="tx1"/>
+                </a:solidFill>
+                <a:latin typeface="Arial" panose="020B0604020202020204" pitchFamily="34" charset="0"/>
+              </a:defRPr>
+            </a:lvl1pPr>
+            <a:lvl2pPr marL="742950" indent="-285750">
+              <a:defRPr>
+                <a:solidFill>
+                  <a:schemeClr val="tx1"/>
+                </a:solidFill>
+                <a:latin typeface="Arial" panose="020B0604020202020204" pitchFamily="34" charset="0"/>
+              </a:defRPr>
+            </a:lvl2pPr>
+            <a:lvl3pPr marL="1143000" indent="-228600">
+              <a:defRPr>
+                <a:solidFill>
+                  <a:schemeClr val="tx1"/>
+                </a:solidFill>
+                <a:latin typeface="Arial" panose="020B0604020202020204" pitchFamily="34" charset="0"/>
+              </a:defRPr>
+            </a:lvl3pPr>
+            <a:lvl4pPr marL="1600200" indent="-228600">
+              <a:defRPr>
+                <a:solidFill>
+                  <a:schemeClr val="tx1"/>
+                </a:solidFill>
+                <a:latin typeface="Arial" panose="020B0604020202020204" pitchFamily="34" charset="0"/>
+              </a:defRPr>
+            </a:lvl4pPr>
+            <a:lvl5pPr marL="2057400" indent="-228600">
+              <a:defRPr>
+                <a:solidFill>
+                  <a:schemeClr val="tx1"/>
+                </a:solidFill>
+                <a:latin typeface="Arial" panose="020B0604020202020204" pitchFamily="34" charset="0"/>
+              </a:defRPr>
+            </a:lvl5pPr>
+            <a:lvl6pPr marL="2514600" indent="-228600" eaLnBrk="0" fontAlgn="base" hangingPunct="0">
+              <a:spcBef>
+                <a:spcPct val="0"/>
+              </a:spcBef>
+              <a:spcAft>
+                <a:spcPct val="0"/>
+              </a:spcAft>
+              <a:defRPr>
+                <a:solidFill>
+                  <a:schemeClr val="tx1"/>
+                </a:solidFill>
+                <a:latin typeface="Arial" panose="020B0604020202020204" pitchFamily="34" charset="0"/>
+              </a:defRPr>
+            </a:lvl6pPr>
+            <a:lvl7pPr marL="2971800" indent="-228600" eaLnBrk="0" fontAlgn="base" hangingPunct="0">
+              <a:spcBef>
+                <a:spcPct val="0"/>
+              </a:spcBef>
+              <a:spcAft>
+                <a:spcPct val="0"/>
+              </a:spcAft>
+              <a:defRPr>
+                <a:solidFill>
+                  <a:schemeClr val="tx1"/>
+                </a:solidFill>
+                <a:latin typeface="Arial" panose="020B0604020202020204" pitchFamily="34" charset="0"/>
+              </a:defRPr>
+            </a:lvl7pPr>
+            <a:lvl8pPr marL="3429000" indent="-228600" eaLnBrk="0" fontAlgn="base" hangingPunct="0">
+              <a:spcBef>
+                <a:spcPct val="0"/>
+              </a:spcBef>
+              <a:spcAft>
+                <a:spcPct val="0"/>
+              </a:spcAft>
+              <a:defRPr>
+                <a:solidFill>
+                  <a:schemeClr val="tx1"/>
+                </a:solidFill>
+                <a:latin typeface="Arial" panose="020B0604020202020204" pitchFamily="34" charset="0"/>
+              </a:defRPr>
+            </a:lvl8pPr>
+            <a:lvl9pPr marL="3886200" indent="-228600" eaLnBrk="0" fontAlgn="base" hangingPunct="0">
+              <a:spcBef>
+                <a:spcPct val="0"/>
+              </a:spcBef>
+              <a:spcAft>
+                <a:spcPct val="0"/>
+              </a:spcAft>
+              <a:defRPr>
+                <a:solidFill>
+                  <a:schemeClr val="tx1"/>
+                </a:solidFill>
+                <a:latin typeface="Arial" panose="020B0604020202020204" pitchFamily="34" charset="0"/>
+              </a:defRPr>
+            </a:lvl9pPr>
+          </a:lstStyle>
+          <a:p>
+            <a:endParaRPr lang="es-ES_tradnl" altLang="es-MX" sz="3200" dirty="0"/>
+          </a:p>
+        </p:txBody>
+      </p:sp>
+      <p:sp>
+        <p:nvSpPr>
+          <p:cNvPr id="3" name="Rectángulo 2"/>
+          <p:cNvSpPr/>
+          <p:nvPr/>
+        </p:nvSpPr>
+        <p:spPr>
+          <a:xfrm>
+            <a:off x="450273" y="1627287"/>
+            <a:ext cx="8153400" cy="5078313"/>
+          </a:xfrm>
+          <a:prstGeom prst="rect">
+            <a:avLst/>
+          </a:prstGeom>
+        </p:spPr>
+        <p:txBody>
+          <a:bodyPr wrap="square">
+            <a:spAutoFit/>
+          </a:bodyPr>
+          <a:lstStyle/>
+          <a:p>
+            <a:pPr algn="just"/>
+            <a:r>
+              <a:rPr lang="es-ES" sz="3600" dirty="0">
+                <a:latin typeface="+mn-lt"/>
+                <a:ea typeface="Times New Roman" panose="02020603050405020304" pitchFamily="18" charset="0"/>
+              </a:rPr>
+              <a:t>Una </a:t>
+            </a:r>
+            <a:r>
+              <a:rPr lang="es-ES" sz="3600" b="1" dirty="0">
+                <a:latin typeface="+mn-lt"/>
+                <a:ea typeface="Times New Roman" panose="02020603050405020304" pitchFamily="18" charset="0"/>
+              </a:rPr>
+              <a:t>clase</a:t>
+            </a:r>
+            <a:r>
+              <a:rPr lang="es-ES" sz="3600" dirty="0">
+                <a:latin typeface="+mn-lt"/>
+                <a:ea typeface="Times New Roman" panose="02020603050405020304" pitchFamily="18" charset="0"/>
+              </a:rPr>
+              <a:t> es la definición de las características concretas de un determinado tipo de objetos. Es decir, de cuáles son los datos y los métodos de los que van a disponer todos los objetos de ese tipo. Por esta razón, se suele decir que el </a:t>
+            </a:r>
+            <a:r>
+              <a:rPr lang="es-ES" sz="3600" b="1" dirty="0">
+                <a:latin typeface="+mn-lt"/>
+                <a:ea typeface="Times New Roman" panose="02020603050405020304" pitchFamily="18" charset="0"/>
+              </a:rPr>
+              <a:t>tipo de dato</a:t>
+            </a:r>
+            <a:r>
+              <a:rPr lang="es-ES" sz="3600" dirty="0">
+                <a:latin typeface="+mn-lt"/>
+                <a:ea typeface="Times New Roman" panose="02020603050405020304" pitchFamily="18" charset="0"/>
+              </a:rPr>
+              <a:t> de un objeto es la clase que define las características del mismo</a:t>
+            </a:r>
+            <a:endParaRPr lang="es-MX" sz="3600" dirty="0">
+              <a:latin typeface="+mn-lt"/>
+            </a:endParaRPr>
+          </a:p>
+        </p:txBody>
+      </p:sp>
+    </p:spTree>
+  </p:cSld>
+  <p:clrMapOvr>
+    <a:masterClrMapping/>
+  </p:clrMapOvr>
+  <p:transition spd="med"/>
+  <p:timing>
+    <p:tnLst>
+      <p:par>
+        <p:cTn id="1" dur="indefinite" restart="never" nodeType="tmRoot"/>
+      </p:par>
+    </p:tnLst>
+  </p:timing>
+</p:sld>
+</file>
+
+<file path=ppt/slides/slide30.xml><?xml version="1.0" encoding="utf-8"?>
+<p:sld xmlns:a="http://schemas.openxmlformats.org/drawingml/2006/main" xmlns:r="http://schemas.openxmlformats.org/officeDocument/2006/relationships" xmlns:p="http://schemas.openxmlformats.org/presentationml/2006/main">
+  <p:cSld>
+    <p:spTree>
+      <p:nvGrpSpPr>
+        <p:cNvPr id="1" name=""/>
+        <p:cNvGrpSpPr/>
+        <p:nvPr/>
+      </p:nvGrpSpPr>
+      <p:grpSpPr>
+        <a:xfrm>
+          <a:off x="0" y="0"/>
+          <a:ext cx="0" cy="0"/>
+          <a:chOff x="0" y="0"/>
+          <a:chExt cx="0" cy="0"/>
+        </a:xfrm>
+      </p:grpSpPr>
+      <p:sp>
+        <p:nvSpPr>
+          <p:cNvPr id="5" name="Marcador de número de diapositiva 4"/>
+          <p:cNvSpPr>
+            <a:spLocks noGrp="1"/>
+          </p:cNvSpPr>
+          <p:nvPr>
+            <p:ph type="sldNum" sz="quarter" idx="11"/>
+          </p:nvPr>
+        </p:nvSpPr>
+        <p:spPr/>
+        <p:txBody>
+          <a:bodyPr/>
+          <a:lstStyle/>
+          <a:p>
+            <a:fld id="{CCCB425B-3029-40A4-9A2F-4AD7250EA2D7}" type="slidenum">
+              <a:rPr lang="en-US" altLang="es-MX" smtClean="0"/>
+              <a:pPr/>
+              <a:t>30</a:t>
             </a:fld>
             <a:endParaRPr lang="en-US" altLang="es-MX"/>
           </a:p>
@@ -19914,425 +21210,7 @@
 </p:sld>
 </file>
 
-<file path=ppt/slides/slide3.xml><?xml version="1.0" encoding="utf-8"?>
-<p:sld xmlns:a="http://schemas.openxmlformats.org/drawingml/2006/main" xmlns:r="http://schemas.openxmlformats.org/officeDocument/2006/relationships" xmlns:p="http://schemas.openxmlformats.org/presentationml/2006/main">
-  <p:cSld>
-    <p:spTree>
-      <p:nvGrpSpPr>
-        <p:cNvPr id="1" name=""/>
-        <p:cNvGrpSpPr/>
-        <p:nvPr/>
-      </p:nvGrpSpPr>
-      <p:grpSpPr>
-        <a:xfrm>
-          <a:off x="0" y="0"/>
-          <a:ext cx="0" cy="0"/>
-          <a:chOff x="0" y="0"/>
-          <a:chExt cx="0" cy="0"/>
-        </a:xfrm>
-      </p:grpSpPr>
-      <p:sp>
-        <p:nvSpPr>
-          <p:cNvPr id="6146" name="Slide Number Placeholder 3"/>
-          <p:cNvSpPr>
-            <a:spLocks noGrp="1"/>
-          </p:cNvSpPr>
-          <p:nvPr>
-            <p:ph type="sldNum" sz="quarter" idx="11"/>
-          </p:nvPr>
-        </p:nvSpPr>
-        <p:spPr>
-          <a:noFill/>
-          <a:ln/>
-          <a:extLst>
-            <a:ext uri="{909E8E84-426E-40DD-AFC4-6F175D3DCCD1}">
-              <a14:hiddenFill xmlns:a14="http://schemas.microsoft.com/office/drawing/2010/main">
-                <a:solidFill>
-                  <a:srgbClr val="FFFFFF"/>
-                </a:solidFill>
-              </a14:hiddenFill>
-            </a:ext>
-            <a:ext uri="{91240B29-F687-4F45-9708-019B960494DF}">
-              <a14:hiddenLine xmlns:a14="http://schemas.microsoft.com/office/drawing/2010/main" w="9525">
-                <a:solidFill>
-                  <a:srgbClr val="000000"/>
-                </a:solidFill>
-                <a:miter lim="800000"/>
-                <a:headEnd/>
-                <a:tailEnd/>
-              </a14:hiddenLine>
-            </a:ext>
-          </a:extLst>
-        </p:spPr>
-        <p:txBody>
-          <a:bodyPr/>
-          <a:lstStyle>
-            <a:lvl1pPr>
-              <a:defRPr>
-                <a:solidFill>
-                  <a:schemeClr val="tx1"/>
-                </a:solidFill>
-                <a:latin typeface="Arial" panose="020B0604020202020204" pitchFamily="34" charset="0"/>
-              </a:defRPr>
-            </a:lvl1pPr>
-            <a:lvl2pPr marL="742950" indent="-285750">
-              <a:defRPr>
-                <a:solidFill>
-                  <a:schemeClr val="tx1"/>
-                </a:solidFill>
-                <a:latin typeface="Arial" panose="020B0604020202020204" pitchFamily="34" charset="0"/>
-              </a:defRPr>
-            </a:lvl2pPr>
-            <a:lvl3pPr marL="1143000" indent="-228600">
-              <a:defRPr>
-                <a:solidFill>
-                  <a:schemeClr val="tx1"/>
-                </a:solidFill>
-                <a:latin typeface="Arial" panose="020B0604020202020204" pitchFamily="34" charset="0"/>
-              </a:defRPr>
-            </a:lvl3pPr>
-            <a:lvl4pPr marL="1600200" indent="-228600">
-              <a:defRPr>
-                <a:solidFill>
-                  <a:schemeClr val="tx1"/>
-                </a:solidFill>
-                <a:latin typeface="Arial" panose="020B0604020202020204" pitchFamily="34" charset="0"/>
-              </a:defRPr>
-            </a:lvl4pPr>
-            <a:lvl5pPr marL="2057400" indent="-228600">
-              <a:defRPr>
-                <a:solidFill>
-                  <a:schemeClr val="tx1"/>
-                </a:solidFill>
-                <a:latin typeface="Arial" panose="020B0604020202020204" pitchFamily="34" charset="0"/>
-              </a:defRPr>
-            </a:lvl5pPr>
-            <a:lvl6pPr marL="2514600" indent="-228600" eaLnBrk="0" fontAlgn="base" hangingPunct="0">
-              <a:spcBef>
-                <a:spcPct val="0"/>
-              </a:spcBef>
-              <a:spcAft>
-                <a:spcPct val="0"/>
-              </a:spcAft>
-              <a:defRPr>
-                <a:solidFill>
-                  <a:schemeClr val="tx1"/>
-                </a:solidFill>
-                <a:latin typeface="Arial" panose="020B0604020202020204" pitchFamily="34" charset="0"/>
-              </a:defRPr>
-            </a:lvl6pPr>
-            <a:lvl7pPr marL="2971800" indent="-228600" eaLnBrk="0" fontAlgn="base" hangingPunct="0">
-              <a:spcBef>
-                <a:spcPct val="0"/>
-              </a:spcBef>
-              <a:spcAft>
-                <a:spcPct val="0"/>
-              </a:spcAft>
-              <a:defRPr>
-                <a:solidFill>
-                  <a:schemeClr val="tx1"/>
-                </a:solidFill>
-                <a:latin typeface="Arial" panose="020B0604020202020204" pitchFamily="34" charset="0"/>
-              </a:defRPr>
-            </a:lvl7pPr>
-            <a:lvl8pPr marL="3429000" indent="-228600" eaLnBrk="0" fontAlgn="base" hangingPunct="0">
-              <a:spcBef>
-                <a:spcPct val="0"/>
-              </a:spcBef>
-              <a:spcAft>
-                <a:spcPct val="0"/>
-              </a:spcAft>
-              <a:defRPr>
-                <a:solidFill>
-                  <a:schemeClr val="tx1"/>
-                </a:solidFill>
-                <a:latin typeface="Arial" panose="020B0604020202020204" pitchFamily="34" charset="0"/>
-              </a:defRPr>
-            </a:lvl8pPr>
-            <a:lvl9pPr marL="3886200" indent="-228600" eaLnBrk="0" fontAlgn="base" hangingPunct="0">
-              <a:spcBef>
-                <a:spcPct val="0"/>
-              </a:spcBef>
-              <a:spcAft>
-                <a:spcPct val="0"/>
-              </a:spcAft>
-              <a:defRPr>
-                <a:solidFill>
-                  <a:schemeClr val="tx1"/>
-                </a:solidFill>
-                <a:latin typeface="Arial" panose="020B0604020202020204" pitchFamily="34" charset="0"/>
-              </a:defRPr>
-            </a:lvl9pPr>
-          </a:lstStyle>
-          <a:p>
-            <a:fld id="{7A9385D2-0AA6-4174-824D-EECB24A688AF}" type="slidenum">
-              <a:rPr lang="en-US" altLang="es-MX">
-                <a:latin typeface="Arial Black" panose="020B0A04020102020204" pitchFamily="34" charset="0"/>
-              </a:rPr>
-              <a:pPr/>
-              <a:t>3</a:t>
-            </a:fld>
-            <a:endParaRPr lang="en-US" altLang="es-MX">
-              <a:latin typeface="Arial Black" panose="020B0A04020102020204" pitchFamily="34" charset="0"/>
-            </a:endParaRPr>
-          </a:p>
-        </p:txBody>
-      </p:sp>
-      <p:sp>
-        <p:nvSpPr>
-          <p:cNvPr id="6147" name="Rectangle 4"/>
-          <p:cNvSpPr>
-            <a:spLocks noGrp="1" noChangeArrowheads="1"/>
-          </p:cNvSpPr>
-          <p:nvPr>
-            <p:ph type="title"/>
-          </p:nvPr>
-        </p:nvSpPr>
-        <p:spPr/>
-        <p:txBody>
-          <a:bodyPr/>
-          <a:lstStyle/>
-          <a:p>
-            <a:pPr eaLnBrk="1" hangingPunct="1"/>
-            <a:r>
-              <a:rPr lang="es-ES_tradnl" altLang="es-MX" sz="4000" b="1" dirty="0" smtClean="0"/>
-              <a:t>4</a:t>
-            </a:r>
-            <a:r>
-              <a:rPr lang="es-ES_tradnl" altLang="es-MX" sz="4000" b="1" dirty="0" smtClean="0"/>
-              <a:t>.1 Concepto de clase</a:t>
-            </a:r>
-            <a:endParaRPr lang="en-US" altLang="es-MX" sz="4000" b="1" dirty="0" smtClean="0"/>
-          </a:p>
-        </p:txBody>
-      </p:sp>
-      <p:sp>
-        <p:nvSpPr>
-          <p:cNvPr id="6148" name="Rectangle 5"/>
-          <p:cNvSpPr>
-            <a:spLocks noChangeArrowheads="1"/>
-          </p:cNvSpPr>
-          <p:nvPr/>
-        </p:nvSpPr>
-        <p:spPr bwMode="auto">
-          <a:xfrm>
-            <a:off x="1430338" y="3181985"/>
-            <a:ext cx="65" cy="492443"/>
-          </a:xfrm>
-          <a:prstGeom prst="rect">
-            <a:avLst/>
-          </a:prstGeom>
-          <a:noFill/>
-          <a:ln>
-            <a:noFill/>
-          </a:ln>
-          <a:extLst>
-            <a:ext uri="{909E8E84-426E-40DD-AFC4-6F175D3DCCD1}">
-              <a14:hiddenFill xmlns:a14="http://schemas.microsoft.com/office/drawing/2010/main">
-                <a:solidFill>
-                  <a:srgbClr val="FFFFFF"/>
-                </a:solidFill>
-              </a14:hiddenFill>
-            </a:ext>
-            <a:ext uri="{91240B29-F687-4F45-9708-019B960494DF}">
-              <a14:hiddenLine xmlns:a14="http://schemas.microsoft.com/office/drawing/2010/main" w="9525">
-                <a:solidFill>
-                  <a:srgbClr val="000000"/>
-                </a:solidFill>
-                <a:miter lim="800000"/>
-                <a:headEnd/>
-                <a:tailEnd/>
-              </a14:hiddenLine>
-            </a:ext>
-          </a:extLst>
-        </p:spPr>
-        <p:txBody>
-          <a:bodyPr wrap="none" lIns="0" tIns="0" rIns="0" bIns="0" anchor="ctr">
-            <a:spAutoFit/>
-          </a:bodyPr>
-          <a:lstStyle>
-            <a:lvl1pPr>
-              <a:defRPr>
-                <a:solidFill>
-                  <a:schemeClr val="tx1"/>
-                </a:solidFill>
-                <a:latin typeface="Arial" panose="020B0604020202020204" pitchFamily="34" charset="0"/>
-              </a:defRPr>
-            </a:lvl1pPr>
-            <a:lvl2pPr marL="742950" indent="-285750">
-              <a:defRPr>
-                <a:solidFill>
-                  <a:schemeClr val="tx1"/>
-                </a:solidFill>
-                <a:latin typeface="Arial" panose="020B0604020202020204" pitchFamily="34" charset="0"/>
-              </a:defRPr>
-            </a:lvl2pPr>
-            <a:lvl3pPr marL="1143000" indent="-228600">
-              <a:defRPr>
-                <a:solidFill>
-                  <a:schemeClr val="tx1"/>
-                </a:solidFill>
-                <a:latin typeface="Arial" panose="020B0604020202020204" pitchFamily="34" charset="0"/>
-              </a:defRPr>
-            </a:lvl3pPr>
-            <a:lvl4pPr marL="1600200" indent="-228600">
-              <a:defRPr>
-                <a:solidFill>
-                  <a:schemeClr val="tx1"/>
-                </a:solidFill>
-                <a:latin typeface="Arial" panose="020B0604020202020204" pitchFamily="34" charset="0"/>
-              </a:defRPr>
-            </a:lvl4pPr>
-            <a:lvl5pPr marL="2057400" indent="-228600">
-              <a:defRPr>
-                <a:solidFill>
-                  <a:schemeClr val="tx1"/>
-                </a:solidFill>
-                <a:latin typeface="Arial" panose="020B0604020202020204" pitchFamily="34" charset="0"/>
-              </a:defRPr>
-            </a:lvl5pPr>
-            <a:lvl6pPr marL="2514600" indent="-228600" eaLnBrk="0" fontAlgn="base" hangingPunct="0">
-              <a:spcBef>
-                <a:spcPct val="0"/>
-              </a:spcBef>
-              <a:spcAft>
-                <a:spcPct val="0"/>
-              </a:spcAft>
-              <a:defRPr>
-                <a:solidFill>
-                  <a:schemeClr val="tx1"/>
-                </a:solidFill>
-                <a:latin typeface="Arial" panose="020B0604020202020204" pitchFamily="34" charset="0"/>
-              </a:defRPr>
-            </a:lvl6pPr>
-            <a:lvl7pPr marL="2971800" indent="-228600" eaLnBrk="0" fontAlgn="base" hangingPunct="0">
-              <a:spcBef>
-                <a:spcPct val="0"/>
-              </a:spcBef>
-              <a:spcAft>
-                <a:spcPct val="0"/>
-              </a:spcAft>
-              <a:defRPr>
-                <a:solidFill>
-                  <a:schemeClr val="tx1"/>
-                </a:solidFill>
-                <a:latin typeface="Arial" panose="020B0604020202020204" pitchFamily="34" charset="0"/>
-              </a:defRPr>
-            </a:lvl7pPr>
-            <a:lvl8pPr marL="3429000" indent="-228600" eaLnBrk="0" fontAlgn="base" hangingPunct="0">
-              <a:spcBef>
-                <a:spcPct val="0"/>
-              </a:spcBef>
-              <a:spcAft>
-                <a:spcPct val="0"/>
-              </a:spcAft>
-              <a:defRPr>
-                <a:solidFill>
-                  <a:schemeClr val="tx1"/>
-                </a:solidFill>
-                <a:latin typeface="Arial" panose="020B0604020202020204" pitchFamily="34" charset="0"/>
-              </a:defRPr>
-            </a:lvl8pPr>
-            <a:lvl9pPr marL="3886200" indent="-228600" eaLnBrk="0" fontAlgn="base" hangingPunct="0">
-              <a:spcBef>
-                <a:spcPct val="0"/>
-              </a:spcBef>
-              <a:spcAft>
-                <a:spcPct val="0"/>
-              </a:spcAft>
-              <a:defRPr>
-                <a:solidFill>
-                  <a:schemeClr val="tx1"/>
-                </a:solidFill>
-                <a:latin typeface="Arial" panose="020B0604020202020204" pitchFamily="34" charset="0"/>
-              </a:defRPr>
-            </a:lvl9pPr>
-          </a:lstStyle>
-          <a:p>
-            <a:endParaRPr lang="es-ES_tradnl" altLang="es-MX" sz="3200" dirty="0"/>
-          </a:p>
-        </p:txBody>
-      </p:sp>
-      <p:sp>
-        <p:nvSpPr>
-          <p:cNvPr id="3" name="Rectángulo 2"/>
-          <p:cNvSpPr/>
-          <p:nvPr/>
-        </p:nvSpPr>
-        <p:spPr>
-          <a:xfrm>
-            <a:off x="450273" y="1627287"/>
-            <a:ext cx="8153400" cy="5078313"/>
-          </a:xfrm>
-          <a:prstGeom prst="rect">
-            <a:avLst/>
-          </a:prstGeom>
-        </p:spPr>
-        <p:txBody>
-          <a:bodyPr wrap="square">
-            <a:spAutoFit/>
-          </a:bodyPr>
-          <a:lstStyle/>
-          <a:p>
-            <a:pPr algn="just"/>
-            <a:r>
-              <a:rPr lang="es-ES" sz="3600" dirty="0">
-                <a:latin typeface="+mn-lt"/>
-                <a:ea typeface="Times New Roman" panose="02020603050405020304" pitchFamily="18" charset="0"/>
-              </a:rPr>
-              <a:t>Una </a:t>
-            </a:r>
-            <a:r>
-              <a:rPr lang="es-ES" sz="3600" b="1" dirty="0">
-                <a:latin typeface="+mn-lt"/>
-                <a:ea typeface="Times New Roman" panose="02020603050405020304" pitchFamily="18" charset="0"/>
-              </a:rPr>
-              <a:t>clase</a:t>
-            </a:r>
-            <a:r>
-              <a:rPr lang="es-ES" sz="3600" dirty="0">
-                <a:latin typeface="+mn-lt"/>
-                <a:ea typeface="Times New Roman" panose="02020603050405020304" pitchFamily="18" charset="0"/>
-              </a:rPr>
-              <a:t> es la definición de las características concretas de un determinado tipo de objetos. Es decir, de cuáles son los datos y los métodos de los que van a disponer todos los objetos de ese tipo. Por esta razón, se suele decir que el </a:t>
-            </a:r>
-            <a:r>
-              <a:rPr lang="es-ES" sz="3600" b="1" dirty="0">
-                <a:latin typeface="+mn-lt"/>
-                <a:ea typeface="Times New Roman" panose="02020603050405020304" pitchFamily="18" charset="0"/>
-              </a:rPr>
-              <a:t>tipo de dato</a:t>
-            </a:r>
-            <a:r>
-              <a:rPr lang="es-ES" sz="3600" dirty="0">
-                <a:latin typeface="+mn-lt"/>
-                <a:ea typeface="Times New Roman" panose="02020603050405020304" pitchFamily="18" charset="0"/>
-              </a:rPr>
-              <a:t> de un objeto es la clase que define las características del mismo</a:t>
-            </a:r>
-            <a:endParaRPr lang="es-MX" sz="3600" dirty="0">
-              <a:latin typeface="+mn-lt"/>
-            </a:endParaRPr>
-          </a:p>
-        </p:txBody>
-      </p:sp>
-    </p:spTree>
-  </p:cSld>
-  <p:clrMapOvr>
-    <a:masterClrMapping/>
-  </p:clrMapOvr>
-  <p:transition spd="med"/>
-  <p:timing>
-    <p:tnLst>
-      <p:par>
-        <p:cTn id="1" dur="indefinite" restart="never" nodeType="tmRoot"/>
-      </p:par>
-    </p:tnLst>
-  </p:timing>
-</p:sld>
-</file>
-
-<file path=ppt/slides/slide30.xml><?xml version="1.0" encoding="utf-8"?>
+<file path=ppt/slides/slide31.xml><?xml version="1.0" encoding="utf-8"?>
 <p:sld xmlns:a="http://schemas.openxmlformats.org/drawingml/2006/main" xmlns:r="http://schemas.openxmlformats.org/officeDocument/2006/relationships" xmlns:p="http://schemas.openxmlformats.org/presentationml/2006/main">
   <p:cSld>
     <p:spTree>
@@ -20367,7 +21245,7 @@
             <a:fld id="{CCCB425B-3029-40A4-9A2F-4AD7250EA2D7}" type="slidenum">
               <a:rPr lang="en-US" altLang="es-MX" smtClean="0"/>
               <a:pPr/>
-              <a:t>30</a:t>
+              <a:t>31</a:t>
             </a:fld>
             <a:endParaRPr lang="en-US" altLang="es-MX"/>
           </a:p>
@@ -20663,7 +21541,7 @@
 </p:sld>
 </file>
 
-<file path=ppt/slides/slide31.xml><?xml version="1.0" encoding="utf-8"?>
+<file path=ppt/slides/slide32.xml><?xml version="1.0" encoding="utf-8"?>
 <p:sld xmlns:a="http://schemas.openxmlformats.org/drawingml/2006/main" xmlns:r="http://schemas.openxmlformats.org/officeDocument/2006/relationships" xmlns:p="http://schemas.openxmlformats.org/presentationml/2006/main">
   <p:cSld>
     <p:spTree>
@@ -20698,7 +21576,7 @@
             <a:fld id="{CCCB425B-3029-40A4-9A2F-4AD7250EA2D7}" type="slidenum">
               <a:rPr lang="en-US" altLang="es-MX" smtClean="0"/>
               <a:pPr/>
-              <a:t>31</a:t>
+              <a:t>32</a:t>
             </a:fld>
             <a:endParaRPr lang="en-US" altLang="es-MX"/>
           </a:p>
@@ -21113,7 +21991,7 @@
 </p:sld>
 </file>
 
-<file path=ppt/slides/slide32.xml><?xml version="1.0" encoding="utf-8"?>
+<file path=ppt/slides/slide33.xml><?xml version="1.0" encoding="utf-8"?>
 <p:sld xmlns:a="http://schemas.openxmlformats.org/drawingml/2006/main" xmlns:r="http://schemas.openxmlformats.org/officeDocument/2006/relationships" xmlns:p="http://schemas.openxmlformats.org/presentationml/2006/main">
   <p:cSld>
     <p:spTree>
@@ -21148,7 +22026,7 @@
             <a:fld id="{CCCB425B-3029-40A4-9A2F-4AD7250EA2D7}" type="slidenum">
               <a:rPr lang="en-US" altLang="es-MX" smtClean="0"/>
               <a:pPr/>
-              <a:t>32</a:t>
+              <a:t>33</a:t>
             </a:fld>
             <a:endParaRPr lang="en-US" altLang="es-MX"/>
           </a:p>
@@ -22350,7 +23228,7 @@
 </p:sld>
 </file>
 
-<file path=ppt/slides/slide33.xml><?xml version="1.0" encoding="utf-8"?>
+<file path=ppt/slides/slide34.xml><?xml version="1.0" encoding="utf-8"?>
 <p:sld xmlns:a="http://schemas.openxmlformats.org/drawingml/2006/main" xmlns:r="http://schemas.openxmlformats.org/officeDocument/2006/relationships" xmlns:p="http://schemas.openxmlformats.org/presentationml/2006/main">
   <p:cSld>
     <p:spTree>
@@ -22506,7 +23384,7 @@
                 <a:latin typeface="Arial Black" panose="020B0A04020102020204" pitchFamily="34" charset="0"/>
               </a:rPr>
               <a:pPr/>
-              <a:t>33</a:t>
+              <a:t>34</a:t>
             </a:fld>
             <a:endParaRPr lang="en-US" altLang="es-MX">
               <a:latin typeface="Arial Black" panose="020B0A04020102020204" pitchFamily="34" charset="0"/>
@@ -22812,9 +23690,6 @@
               </a:rPr>
               <a:t>Constructores</a:t>
             </a:r>
-            <a:endParaRPr lang="es-ES_tradnl" altLang="es-MX" sz="3600" dirty="0" smtClean="0">
-              <a:latin typeface="+mj-lt"/>
-            </a:endParaRPr>
           </a:p>
           <a:p>
             <a:pPr marL="342900" indent="-342900" eaLnBrk="1" hangingPunct="1">

</xml_diff>